<commit_message>
update R6 and R16
R6 - update 'remove reduntant rules' codes
R16 - rewrite stacking introduction
</commit_message>
<xml_diff>
--- a/R16/Pictures.pptx
+++ b/R16/Pictures.pptx
@@ -9,7 +9,8 @@
     <p:sldId id="258" r:id="rId3"/>
     <p:sldId id="260" r:id="rId4"/>
     <p:sldId id="261" r:id="rId5"/>
-    <p:sldId id="262" r:id="rId6"/>
+    <p:sldId id="264" r:id="rId6"/>
+    <p:sldId id="262" r:id="rId7"/>
   </p:sldIdLst>
   <p:sldSz cx="9144000" cy="6858000" type="screen4x3"/>
   <p:notesSz cx="6858000" cy="9144000"/>
@@ -108,6 +109,22 @@
       </a:defRPr>
     </a:lvl9pPr>
   </p:defaultTextStyle>
+  <p:extLst>
+    <p:ext uri="{EFAFB233-063F-42B5-8137-9DF3F51BA10A}">
+      <p15:sldGuideLst xmlns:p15="http://schemas.microsoft.com/office/powerpoint/2012/main">
+        <p15:guide id="1" orient="horz" pos="2160">
+          <p15:clr>
+            <a:srgbClr val="A4A3A4"/>
+          </p15:clr>
+        </p15:guide>
+        <p15:guide id="2" pos="2880">
+          <p15:clr>
+            <a:srgbClr val="A4A3A4"/>
+          </p15:clr>
+        </p15:guide>
+      </p15:sldGuideLst>
+    </p:ext>
+  </p:extLst>
 </p:presentation>
 </file>
 
@@ -149,10 +166,9 @@
           <a:lstStyle/>
           <a:p>
             <a:r>
-              <a:rPr lang="zh-TW" altLang="en-US" smtClean="0"/>
+              <a:rPr lang="zh-TW" altLang="en-US"/>
               <a:t>按一下以編輯母片標題樣式</a:t>
             </a:r>
-            <a:endParaRPr lang="zh-TW" altLang="en-US"/>
           </a:p>
         </p:txBody>
       </p:sp>
@@ -268,10 +284,9 @@
           </a:lstStyle>
           <a:p>
             <a:r>
-              <a:rPr lang="zh-TW" altLang="en-US" smtClean="0"/>
+              <a:rPr lang="zh-TW" altLang="en-US"/>
               <a:t>按一下以編輯母片副標題樣式</a:t>
             </a:r>
-            <a:endParaRPr lang="zh-TW" altLang="en-US"/>
           </a:p>
         </p:txBody>
       </p:sp>
@@ -292,7 +307,7 @@
           <a:p>
             <a:fld id="{743FA492-2FAE-4B12-9290-22B024A9874A}" type="datetimeFigureOut">
               <a:rPr lang="zh-TW" altLang="en-US" smtClean="0"/>
-              <a:t>2018/3/1</a:t>
+              <a:t>2018/3/24</a:t>
             </a:fld>
             <a:endParaRPr lang="zh-TW" altLang="en-US"/>
           </a:p>
@@ -386,10 +401,9 @@
           <a:lstStyle/>
           <a:p>
             <a:r>
-              <a:rPr lang="zh-TW" altLang="en-US" smtClean="0"/>
+              <a:rPr lang="zh-TW" altLang="en-US"/>
               <a:t>按一下以編輯母片標題樣式</a:t>
             </a:r>
-            <a:endParaRPr lang="zh-TW" altLang="en-US"/>
           </a:p>
         </p:txBody>
       </p:sp>
@@ -410,38 +424,37 @@
           <a:p>
             <a:pPr lvl="0"/>
             <a:r>
-              <a:rPr lang="zh-TW" altLang="en-US" smtClean="0"/>
+              <a:rPr lang="zh-TW" altLang="en-US"/>
               <a:t>按一下以編輯母片文字樣式</a:t>
             </a:r>
           </a:p>
           <a:p>
             <a:pPr lvl="1"/>
             <a:r>
-              <a:rPr lang="zh-TW" altLang="en-US" smtClean="0"/>
+              <a:rPr lang="zh-TW" altLang="en-US"/>
               <a:t>第二層</a:t>
             </a:r>
           </a:p>
           <a:p>
             <a:pPr lvl="2"/>
             <a:r>
-              <a:rPr lang="zh-TW" altLang="en-US" smtClean="0"/>
+              <a:rPr lang="zh-TW" altLang="en-US"/>
               <a:t>第三層</a:t>
             </a:r>
           </a:p>
           <a:p>
             <a:pPr lvl="3"/>
             <a:r>
-              <a:rPr lang="zh-TW" altLang="en-US" smtClean="0"/>
+              <a:rPr lang="zh-TW" altLang="en-US"/>
               <a:t>第四層</a:t>
             </a:r>
           </a:p>
           <a:p>
             <a:pPr lvl="4"/>
             <a:r>
-              <a:rPr lang="zh-TW" altLang="en-US" smtClean="0"/>
+              <a:rPr lang="zh-TW" altLang="en-US"/>
               <a:t>第五層</a:t>
             </a:r>
-            <a:endParaRPr lang="zh-TW" altLang="en-US"/>
           </a:p>
         </p:txBody>
       </p:sp>
@@ -462,7 +475,7 @@
           <a:p>
             <a:fld id="{743FA492-2FAE-4B12-9290-22B024A9874A}" type="datetimeFigureOut">
               <a:rPr lang="zh-TW" altLang="en-US" smtClean="0"/>
-              <a:t>2018/3/1</a:t>
+              <a:t>2018/3/24</a:t>
             </a:fld>
             <a:endParaRPr lang="zh-TW" altLang="en-US"/>
           </a:p>
@@ -561,10 +574,9 @@
           <a:lstStyle/>
           <a:p>
             <a:r>
-              <a:rPr lang="zh-TW" altLang="en-US" smtClean="0"/>
+              <a:rPr lang="zh-TW" altLang="en-US"/>
               <a:t>按一下以編輯母片標題樣式</a:t>
             </a:r>
-            <a:endParaRPr lang="zh-TW" altLang="en-US"/>
           </a:p>
         </p:txBody>
       </p:sp>
@@ -590,38 +602,37 @@
           <a:p>
             <a:pPr lvl="0"/>
             <a:r>
-              <a:rPr lang="zh-TW" altLang="en-US" smtClean="0"/>
+              <a:rPr lang="zh-TW" altLang="en-US"/>
               <a:t>按一下以編輯母片文字樣式</a:t>
             </a:r>
           </a:p>
           <a:p>
             <a:pPr lvl="1"/>
             <a:r>
-              <a:rPr lang="zh-TW" altLang="en-US" smtClean="0"/>
+              <a:rPr lang="zh-TW" altLang="en-US"/>
               <a:t>第二層</a:t>
             </a:r>
           </a:p>
           <a:p>
             <a:pPr lvl="2"/>
             <a:r>
-              <a:rPr lang="zh-TW" altLang="en-US" smtClean="0"/>
+              <a:rPr lang="zh-TW" altLang="en-US"/>
               <a:t>第三層</a:t>
             </a:r>
           </a:p>
           <a:p>
             <a:pPr lvl="3"/>
             <a:r>
-              <a:rPr lang="zh-TW" altLang="en-US" smtClean="0"/>
+              <a:rPr lang="zh-TW" altLang="en-US"/>
               <a:t>第四層</a:t>
             </a:r>
           </a:p>
           <a:p>
             <a:pPr lvl="4"/>
             <a:r>
-              <a:rPr lang="zh-TW" altLang="en-US" smtClean="0"/>
+              <a:rPr lang="zh-TW" altLang="en-US"/>
               <a:t>第五層</a:t>
             </a:r>
-            <a:endParaRPr lang="zh-TW" altLang="en-US"/>
           </a:p>
         </p:txBody>
       </p:sp>
@@ -642,7 +653,7 @@
           <a:p>
             <a:fld id="{743FA492-2FAE-4B12-9290-22B024A9874A}" type="datetimeFigureOut">
               <a:rPr lang="zh-TW" altLang="en-US" smtClean="0"/>
-              <a:t>2018/3/1</a:t>
+              <a:t>2018/3/24</a:t>
             </a:fld>
             <a:endParaRPr lang="zh-TW" altLang="en-US"/>
           </a:p>
@@ -736,10 +747,9 @@
           <a:lstStyle/>
           <a:p>
             <a:r>
-              <a:rPr lang="zh-TW" altLang="en-US" smtClean="0"/>
+              <a:rPr lang="zh-TW" altLang="en-US"/>
               <a:t>按一下以編輯母片標題樣式</a:t>
             </a:r>
-            <a:endParaRPr lang="zh-TW" altLang="en-US"/>
           </a:p>
         </p:txBody>
       </p:sp>
@@ -760,38 +770,37 @@
           <a:p>
             <a:pPr lvl="0"/>
             <a:r>
-              <a:rPr lang="zh-TW" altLang="en-US" smtClean="0"/>
+              <a:rPr lang="zh-TW" altLang="en-US"/>
               <a:t>按一下以編輯母片文字樣式</a:t>
             </a:r>
           </a:p>
           <a:p>
             <a:pPr lvl="1"/>
             <a:r>
-              <a:rPr lang="zh-TW" altLang="en-US" smtClean="0"/>
+              <a:rPr lang="zh-TW" altLang="en-US"/>
               <a:t>第二層</a:t>
             </a:r>
           </a:p>
           <a:p>
             <a:pPr lvl="2"/>
             <a:r>
-              <a:rPr lang="zh-TW" altLang="en-US" smtClean="0"/>
+              <a:rPr lang="zh-TW" altLang="en-US"/>
               <a:t>第三層</a:t>
             </a:r>
           </a:p>
           <a:p>
             <a:pPr lvl="3"/>
             <a:r>
-              <a:rPr lang="zh-TW" altLang="en-US" smtClean="0"/>
+              <a:rPr lang="zh-TW" altLang="en-US"/>
               <a:t>第四層</a:t>
             </a:r>
           </a:p>
           <a:p>
             <a:pPr lvl="4"/>
             <a:r>
-              <a:rPr lang="zh-TW" altLang="en-US" smtClean="0"/>
+              <a:rPr lang="zh-TW" altLang="en-US"/>
               <a:t>第五層</a:t>
             </a:r>
-            <a:endParaRPr lang="zh-TW" altLang="en-US"/>
           </a:p>
         </p:txBody>
       </p:sp>
@@ -812,7 +821,7 @@
           <a:p>
             <a:fld id="{743FA492-2FAE-4B12-9290-22B024A9874A}" type="datetimeFigureOut">
               <a:rPr lang="zh-TW" altLang="en-US" smtClean="0"/>
-              <a:t>2018/3/1</a:t>
+              <a:t>2018/3/24</a:t>
             </a:fld>
             <a:endParaRPr lang="zh-TW" altLang="en-US"/>
           </a:p>
@@ -915,10 +924,9 @@
           </a:lstStyle>
           <a:p>
             <a:r>
-              <a:rPr lang="zh-TW" altLang="en-US" smtClean="0"/>
+              <a:rPr lang="zh-TW" altLang="en-US"/>
               <a:t>按一下以編輯母片標題樣式</a:t>
             </a:r>
-            <a:endParaRPr lang="zh-TW" altLang="en-US"/>
           </a:p>
         </p:txBody>
       </p:sp>
@@ -1035,7 +1043,7 @@
           <a:p>
             <a:pPr lvl="0"/>
             <a:r>
-              <a:rPr lang="zh-TW" altLang="en-US" smtClean="0"/>
+              <a:rPr lang="zh-TW" altLang="en-US"/>
               <a:t>按一下以編輯母片文字樣式</a:t>
             </a:r>
           </a:p>
@@ -1058,7 +1066,7 @@
           <a:p>
             <a:fld id="{743FA492-2FAE-4B12-9290-22B024A9874A}" type="datetimeFigureOut">
               <a:rPr lang="zh-TW" altLang="en-US" smtClean="0"/>
-              <a:t>2018/3/1</a:t>
+              <a:t>2018/3/24</a:t>
             </a:fld>
             <a:endParaRPr lang="zh-TW" altLang="en-US"/>
           </a:p>
@@ -1152,10 +1160,9 @@
           <a:lstStyle/>
           <a:p>
             <a:r>
-              <a:rPr lang="zh-TW" altLang="en-US" smtClean="0"/>
+              <a:rPr lang="zh-TW" altLang="en-US"/>
               <a:t>按一下以編輯母片標題樣式</a:t>
             </a:r>
-            <a:endParaRPr lang="zh-TW" altLang="en-US"/>
           </a:p>
         </p:txBody>
       </p:sp>
@@ -1209,38 +1216,37 @@
           <a:p>
             <a:pPr lvl="0"/>
             <a:r>
-              <a:rPr lang="zh-TW" altLang="en-US" smtClean="0"/>
+              <a:rPr lang="zh-TW" altLang="en-US"/>
               <a:t>按一下以編輯母片文字樣式</a:t>
             </a:r>
           </a:p>
           <a:p>
             <a:pPr lvl="1"/>
             <a:r>
-              <a:rPr lang="zh-TW" altLang="en-US" smtClean="0"/>
+              <a:rPr lang="zh-TW" altLang="en-US"/>
               <a:t>第二層</a:t>
             </a:r>
           </a:p>
           <a:p>
             <a:pPr lvl="2"/>
             <a:r>
-              <a:rPr lang="zh-TW" altLang="en-US" smtClean="0"/>
+              <a:rPr lang="zh-TW" altLang="en-US"/>
               <a:t>第三層</a:t>
             </a:r>
           </a:p>
           <a:p>
             <a:pPr lvl="3"/>
             <a:r>
-              <a:rPr lang="zh-TW" altLang="en-US" smtClean="0"/>
+              <a:rPr lang="zh-TW" altLang="en-US"/>
               <a:t>第四層</a:t>
             </a:r>
           </a:p>
           <a:p>
             <a:pPr lvl="4"/>
             <a:r>
-              <a:rPr lang="zh-TW" altLang="en-US" smtClean="0"/>
+              <a:rPr lang="zh-TW" altLang="en-US"/>
               <a:t>第五層</a:t>
             </a:r>
-            <a:endParaRPr lang="zh-TW" altLang="en-US"/>
           </a:p>
         </p:txBody>
       </p:sp>
@@ -1294,38 +1300,37 @@
           <a:p>
             <a:pPr lvl="0"/>
             <a:r>
-              <a:rPr lang="zh-TW" altLang="en-US" smtClean="0"/>
+              <a:rPr lang="zh-TW" altLang="en-US"/>
               <a:t>按一下以編輯母片文字樣式</a:t>
             </a:r>
           </a:p>
           <a:p>
             <a:pPr lvl="1"/>
             <a:r>
-              <a:rPr lang="zh-TW" altLang="en-US" smtClean="0"/>
+              <a:rPr lang="zh-TW" altLang="en-US"/>
               <a:t>第二層</a:t>
             </a:r>
           </a:p>
           <a:p>
             <a:pPr lvl="2"/>
             <a:r>
-              <a:rPr lang="zh-TW" altLang="en-US" smtClean="0"/>
+              <a:rPr lang="zh-TW" altLang="en-US"/>
               <a:t>第三層</a:t>
             </a:r>
           </a:p>
           <a:p>
             <a:pPr lvl="3"/>
             <a:r>
-              <a:rPr lang="zh-TW" altLang="en-US" smtClean="0"/>
+              <a:rPr lang="zh-TW" altLang="en-US"/>
               <a:t>第四層</a:t>
             </a:r>
           </a:p>
           <a:p>
             <a:pPr lvl="4"/>
             <a:r>
-              <a:rPr lang="zh-TW" altLang="en-US" smtClean="0"/>
+              <a:rPr lang="zh-TW" altLang="en-US"/>
               <a:t>第五層</a:t>
             </a:r>
-            <a:endParaRPr lang="zh-TW" altLang="en-US"/>
           </a:p>
         </p:txBody>
       </p:sp>
@@ -1346,7 +1351,7 @@
           <a:p>
             <a:fld id="{743FA492-2FAE-4B12-9290-22B024A9874A}" type="datetimeFigureOut">
               <a:rPr lang="zh-TW" altLang="en-US" smtClean="0"/>
-              <a:t>2018/3/1</a:t>
+              <a:t>2018/3/24</a:t>
             </a:fld>
             <a:endParaRPr lang="zh-TW" altLang="en-US"/>
           </a:p>
@@ -1444,10 +1449,9 @@
           </a:lstStyle>
           <a:p>
             <a:r>
-              <a:rPr lang="zh-TW" altLang="en-US" smtClean="0"/>
+              <a:rPr lang="zh-TW" altLang="en-US"/>
               <a:t>按一下以編輯母片標題樣式</a:t>
             </a:r>
-            <a:endParaRPr lang="zh-TW" altLang="en-US"/>
           </a:p>
         </p:txBody>
       </p:sp>
@@ -1510,7 +1514,7 @@
           <a:p>
             <a:pPr lvl="0"/>
             <a:r>
-              <a:rPr lang="zh-TW" altLang="en-US" smtClean="0"/>
+              <a:rPr lang="zh-TW" altLang="en-US"/>
               <a:t>按一下以編輯母片文字樣式</a:t>
             </a:r>
           </a:p>
@@ -1566,38 +1570,37 @@
           <a:p>
             <a:pPr lvl="0"/>
             <a:r>
-              <a:rPr lang="zh-TW" altLang="en-US" smtClean="0"/>
+              <a:rPr lang="zh-TW" altLang="en-US"/>
               <a:t>按一下以編輯母片文字樣式</a:t>
             </a:r>
           </a:p>
           <a:p>
             <a:pPr lvl="1"/>
             <a:r>
-              <a:rPr lang="zh-TW" altLang="en-US" smtClean="0"/>
+              <a:rPr lang="zh-TW" altLang="en-US"/>
               <a:t>第二層</a:t>
             </a:r>
           </a:p>
           <a:p>
             <a:pPr lvl="2"/>
             <a:r>
-              <a:rPr lang="zh-TW" altLang="en-US" smtClean="0"/>
+              <a:rPr lang="zh-TW" altLang="en-US"/>
               <a:t>第三層</a:t>
             </a:r>
           </a:p>
           <a:p>
             <a:pPr lvl="3"/>
             <a:r>
-              <a:rPr lang="zh-TW" altLang="en-US" smtClean="0"/>
+              <a:rPr lang="zh-TW" altLang="en-US"/>
               <a:t>第四層</a:t>
             </a:r>
           </a:p>
           <a:p>
             <a:pPr lvl="4"/>
             <a:r>
-              <a:rPr lang="zh-TW" altLang="en-US" smtClean="0"/>
+              <a:rPr lang="zh-TW" altLang="en-US"/>
               <a:t>第五層</a:t>
             </a:r>
-            <a:endParaRPr lang="zh-TW" altLang="en-US"/>
           </a:p>
         </p:txBody>
       </p:sp>
@@ -1660,7 +1663,7 @@
           <a:p>
             <a:pPr lvl="0"/>
             <a:r>
-              <a:rPr lang="zh-TW" altLang="en-US" smtClean="0"/>
+              <a:rPr lang="zh-TW" altLang="en-US"/>
               <a:t>按一下以編輯母片文字樣式</a:t>
             </a:r>
           </a:p>
@@ -1716,38 +1719,37 @@
           <a:p>
             <a:pPr lvl="0"/>
             <a:r>
-              <a:rPr lang="zh-TW" altLang="en-US" smtClean="0"/>
+              <a:rPr lang="zh-TW" altLang="en-US"/>
               <a:t>按一下以編輯母片文字樣式</a:t>
             </a:r>
           </a:p>
           <a:p>
             <a:pPr lvl="1"/>
             <a:r>
-              <a:rPr lang="zh-TW" altLang="en-US" smtClean="0"/>
+              <a:rPr lang="zh-TW" altLang="en-US"/>
               <a:t>第二層</a:t>
             </a:r>
           </a:p>
           <a:p>
             <a:pPr lvl="2"/>
             <a:r>
-              <a:rPr lang="zh-TW" altLang="en-US" smtClean="0"/>
+              <a:rPr lang="zh-TW" altLang="en-US"/>
               <a:t>第三層</a:t>
             </a:r>
           </a:p>
           <a:p>
             <a:pPr lvl="3"/>
             <a:r>
-              <a:rPr lang="zh-TW" altLang="en-US" smtClean="0"/>
+              <a:rPr lang="zh-TW" altLang="en-US"/>
               <a:t>第四層</a:t>
             </a:r>
           </a:p>
           <a:p>
             <a:pPr lvl="4"/>
             <a:r>
-              <a:rPr lang="zh-TW" altLang="en-US" smtClean="0"/>
+              <a:rPr lang="zh-TW" altLang="en-US"/>
               <a:t>第五層</a:t>
             </a:r>
-            <a:endParaRPr lang="zh-TW" altLang="en-US"/>
           </a:p>
         </p:txBody>
       </p:sp>
@@ -1768,7 +1770,7 @@
           <a:p>
             <a:fld id="{743FA492-2FAE-4B12-9290-22B024A9874A}" type="datetimeFigureOut">
               <a:rPr lang="zh-TW" altLang="en-US" smtClean="0"/>
-              <a:t>2018/3/1</a:t>
+              <a:t>2018/3/24</a:t>
             </a:fld>
             <a:endParaRPr lang="zh-TW" altLang="en-US"/>
           </a:p>
@@ -1862,10 +1864,9 @@
           <a:lstStyle/>
           <a:p>
             <a:r>
-              <a:rPr lang="zh-TW" altLang="en-US" smtClean="0"/>
+              <a:rPr lang="zh-TW" altLang="en-US"/>
               <a:t>按一下以編輯母片標題樣式</a:t>
             </a:r>
-            <a:endParaRPr lang="zh-TW" altLang="en-US"/>
           </a:p>
         </p:txBody>
       </p:sp>
@@ -1886,7 +1887,7 @@
           <a:p>
             <a:fld id="{743FA492-2FAE-4B12-9290-22B024A9874A}" type="datetimeFigureOut">
               <a:rPr lang="zh-TW" altLang="en-US" smtClean="0"/>
-              <a:t>2018/3/1</a:t>
+              <a:t>2018/3/24</a:t>
             </a:fld>
             <a:endParaRPr lang="zh-TW" altLang="en-US"/>
           </a:p>
@@ -1981,7 +1982,7 @@
           <a:p>
             <a:fld id="{743FA492-2FAE-4B12-9290-22B024A9874A}" type="datetimeFigureOut">
               <a:rPr lang="zh-TW" altLang="en-US" smtClean="0"/>
-              <a:t>2018/3/1</a:t>
+              <a:t>2018/3/24</a:t>
             </a:fld>
             <a:endParaRPr lang="zh-TW" altLang="en-US"/>
           </a:p>
@@ -2084,10 +2085,9 @@
           </a:lstStyle>
           <a:p>
             <a:r>
-              <a:rPr lang="zh-TW" altLang="en-US" smtClean="0"/>
+              <a:rPr lang="zh-TW" altLang="en-US"/>
               <a:t>按一下以編輯母片標題樣式</a:t>
             </a:r>
-            <a:endParaRPr lang="zh-TW" altLang="en-US"/>
           </a:p>
         </p:txBody>
       </p:sp>
@@ -2141,38 +2141,37 @@
           <a:p>
             <a:pPr lvl="0"/>
             <a:r>
-              <a:rPr lang="zh-TW" altLang="en-US" smtClean="0"/>
+              <a:rPr lang="zh-TW" altLang="en-US"/>
               <a:t>按一下以編輯母片文字樣式</a:t>
             </a:r>
           </a:p>
           <a:p>
             <a:pPr lvl="1"/>
             <a:r>
-              <a:rPr lang="zh-TW" altLang="en-US" smtClean="0"/>
+              <a:rPr lang="zh-TW" altLang="en-US"/>
               <a:t>第二層</a:t>
             </a:r>
           </a:p>
           <a:p>
             <a:pPr lvl="2"/>
             <a:r>
-              <a:rPr lang="zh-TW" altLang="en-US" smtClean="0"/>
+              <a:rPr lang="zh-TW" altLang="en-US"/>
               <a:t>第三層</a:t>
             </a:r>
           </a:p>
           <a:p>
             <a:pPr lvl="3"/>
             <a:r>
-              <a:rPr lang="zh-TW" altLang="en-US" smtClean="0"/>
+              <a:rPr lang="zh-TW" altLang="en-US"/>
               <a:t>第四層</a:t>
             </a:r>
           </a:p>
           <a:p>
             <a:pPr lvl="4"/>
             <a:r>
-              <a:rPr lang="zh-TW" altLang="en-US" smtClean="0"/>
+              <a:rPr lang="zh-TW" altLang="en-US"/>
               <a:t>第五層</a:t>
             </a:r>
-            <a:endParaRPr lang="zh-TW" altLang="en-US"/>
           </a:p>
         </p:txBody>
       </p:sp>
@@ -2235,7 +2234,7 @@
           <a:p>
             <a:pPr lvl="0"/>
             <a:r>
-              <a:rPr lang="zh-TW" altLang="en-US" smtClean="0"/>
+              <a:rPr lang="zh-TW" altLang="en-US"/>
               <a:t>按一下以編輯母片文字樣式</a:t>
             </a:r>
           </a:p>
@@ -2258,7 +2257,7 @@
           <a:p>
             <a:fld id="{743FA492-2FAE-4B12-9290-22B024A9874A}" type="datetimeFigureOut">
               <a:rPr lang="zh-TW" altLang="en-US" smtClean="0"/>
-              <a:t>2018/3/1</a:t>
+              <a:t>2018/3/24</a:t>
             </a:fld>
             <a:endParaRPr lang="zh-TW" altLang="en-US"/>
           </a:p>
@@ -2361,10 +2360,9 @@
           </a:lstStyle>
           <a:p>
             <a:r>
-              <a:rPr lang="zh-TW" altLang="en-US" smtClean="0"/>
+              <a:rPr lang="zh-TW" altLang="en-US"/>
               <a:t>按一下以編輯母片標題樣式</a:t>
             </a:r>
-            <a:endParaRPr lang="zh-TW" altLang="en-US"/>
           </a:p>
         </p:txBody>
       </p:sp>
@@ -2488,7 +2486,7 @@
           <a:p>
             <a:pPr lvl="0"/>
             <a:r>
-              <a:rPr lang="zh-TW" altLang="en-US" smtClean="0"/>
+              <a:rPr lang="zh-TW" altLang="en-US"/>
               <a:t>按一下以編輯母片文字樣式</a:t>
             </a:r>
           </a:p>
@@ -2511,7 +2509,7 @@
           <a:p>
             <a:fld id="{743FA492-2FAE-4B12-9290-22B024A9874A}" type="datetimeFigureOut">
               <a:rPr lang="zh-TW" altLang="en-US" smtClean="0"/>
-              <a:t>2018/3/1</a:t>
+              <a:t>2018/3/24</a:t>
             </a:fld>
             <a:endParaRPr lang="zh-TW" altLang="en-US"/>
           </a:p>
@@ -2620,10 +2618,9 @@
           <a:lstStyle/>
           <a:p>
             <a:r>
-              <a:rPr lang="zh-TW" altLang="en-US" smtClean="0"/>
+              <a:rPr lang="zh-TW" altLang="en-US"/>
               <a:t>按一下以編輯母片標題樣式</a:t>
             </a:r>
-            <a:endParaRPr lang="zh-TW" altLang="en-US"/>
           </a:p>
         </p:txBody>
       </p:sp>
@@ -2654,38 +2651,37 @@
           <a:p>
             <a:pPr lvl="0"/>
             <a:r>
-              <a:rPr lang="zh-TW" altLang="en-US" smtClean="0"/>
+              <a:rPr lang="zh-TW" altLang="en-US"/>
               <a:t>按一下以編輯母片文字樣式</a:t>
             </a:r>
           </a:p>
           <a:p>
             <a:pPr lvl="1"/>
             <a:r>
-              <a:rPr lang="zh-TW" altLang="en-US" smtClean="0"/>
+              <a:rPr lang="zh-TW" altLang="en-US"/>
               <a:t>第二層</a:t>
             </a:r>
           </a:p>
           <a:p>
             <a:pPr lvl="2"/>
             <a:r>
-              <a:rPr lang="zh-TW" altLang="en-US" smtClean="0"/>
+              <a:rPr lang="zh-TW" altLang="en-US"/>
               <a:t>第三層</a:t>
             </a:r>
           </a:p>
           <a:p>
             <a:pPr lvl="3"/>
             <a:r>
-              <a:rPr lang="zh-TW" altLang="en-US" smtClean="0"/>
+              <a:rPr lang="zh-TW" altLang="en-US"/>
               <a:t>第四層</a:t>
             </a:r>
           </a:p>
           <a:p>
             <a:pPr lvl="4"/>
             <a:r>
-              <a:rPr lang="zh-TW" altLang="en-US" smtClean="0"/>
+              <a:rPr lang="zh-TW" altLang="en-US"/>
               <a:t>第五層</a:t>
             </a:r>
-            <a:endParaRPr lang="zh-TW" altLang="en-US"/>
           </a:p>
         </p:txBody>
       </p:sp>
@@ -2724,7 +2720,7 @@
           <a:p>
             <a:fld id="{743FA492-2FAE-4B12-9290-22B024A9874A}" type="datetimeFigureOut">
               <a:rPr lang="zh-TW" altLang="en-US" smtClean="0"/>
-              <a:t>2018/3/1</a:t>
+              <a:t>2018/3/24</a:t>
             </a:fld>
             <a:endParaRPr lang="zh-TW" altLang="en-US"/>
           </a:p>
@@ -3134,7 +3130,7 @@
           <a:p>
             <a:pPr algn="ctr"/>
             <a:r>
-              <a:rPr lang="en-US" altLang="zh-TW" sz="2400" dirty="0" smtClean="0"/>
+              <a:rPr lang="en-US" altLang="zh-TW" sz="2400" dirty="0"/>
               <a:t>Train Data</a:t>
             </a:r>
             <a:endParaRPr lang="zh-TW" altLang="en-US" sz="2400" dirty="0"/>
@@ -3176,7 +3172,7 @@
           <a:p>
             <a:pPr algn="ctr"/>
             <a:r>
-              <a:rPr lang="en-US" altLang="zh-TW" sz="2400" dirty="0" smtClean="0"/>
+              <a:rPr lang="en-US" altLang="zh-TW" sz="2400" dirty="0"/>
               <a:t>Subset 1</a:t>
             </a:r>
             <a:endParaRPr lang="zh-TW" altLang="en-US" sz="2400" dirty="0"/>
@@ -3218,7 +3214,7 @@
           <a:p>
             <a:pPr algn="ctr"/>
             <a:r>
-              <a:rPr lang="en-US" altLang="zh-TW" sz="2400" dirty="0" smtClean="0"/>
+              <a:rPr lang="en-US" altLang="zh-TW" sz="2400" dirty="0"/>
               <a:t>Subset 2</a:t>
             </a:r>
             <a:endParaRPr lang="zh-TW" altLang="en-US" sz="2400" dirty="0"/>
@@ -3260,7 +3256,7 @@
           <a:p>
             <a:pPr algn="ctr"/>
             <a:r>
-              <a:rPr lang="en-US" altLang="zh-TW" sz="2400" dirty="0" smtClean="0"/>
+              <a:rPr lang="en-US" altLang="zh-TW" sz="2400" dirty="0"/>
               <a:t>Subset 3</a:t>
             </a:r>
             <a:endParaRPr lang="zh-TW" altLang="en-US" sz="2400" dirty="0"/>
@@ -3302,7 +3298,7 @@
           <a:p>
             <a:pPr algn="ctr"/>
             <a:r>
-              <a:rPr lang="en-US" altLang="zh-TW" sz="2400" dirty="0" smtClean="0"/>
+              <a:rPr lang="en-US" altLang="zh-TW" sz="2400" dirty="0"/>
               <a:t>Subset 4</a:t>
             </a:r>
             <a:endParaRPr lang="zh-TW" altLang="en-US" sz="2400" dirty="0"/>
@@ -3332,7 +3328,7 @@
           <a:lstStyle/>
           <a:p>
             <a:r>
-              <a:rPr lang="en-US" altLang="zh-TW" sz="4000" dirty="0" smtClean="0"/>
+              <a:rPr lang="en-US" altLang="zh-TW" sz="4000" dirty="0"/>
               <a:t>……</a:t>
             </a:r>
             <a:endParaRPr lang="zh-TW" altLang="en-US" sz="4000" dirty="0"/>
@@ -3518,7 +3514,7 @@
           <a:p>
             <a:pPr algn="ctr"/>
             <a:r>
-              <a:rPr lang="en-US" altLang="zh-TW" sz="2400" dirty="0" smtClean="0"/>
+              <a:rPr lang="en-US" altLang="zh-TW" sz="2400" dirty="0"/>
               <a:t>Model 1</a:t>
             </a:r>
             <a:endParaRPr lang="zh-TW" altLang="en-US" sz="2400" dirty="0"/>
@@ -3596,7 +3592,7 @@
           <a:p>
             <a:pPr algn="ctr"/>
             <a:r>
-              <a:rPr lang="en-US" altLang="zh-TW" sz="2400" dirty="0" smtClean="0"/>
+              <a:rPr lang="en-US" altLang="zh-TW" sz="2400" dirty="0"/>
               <a:t>Model 2</a:t>
             </a:r>
             <a:endParaRPr lang="zh-TW" altLang="en-US" sz="2400" dirty="0"/>
@@ -3674,7 +3670,7 @@
           <a:p>
             <a:pPr algn="ctr"/>
             <a:r>
-              <a:rPr lang="en-US" altLang="zh-TW" sz="2400" dirty="0" smtClean="0"/>
+              <a:rPr lang="en-US" altLang="zh-TW" sz="2400" dirty="0"/>
               <a:t>Model 3</a:t>
             </a:r>
             <a:endParaRPr lang="zh-TW" altLang="en-US" sz="2400" dirty="0"/>
@@ -3752,7 +3748,7 @@
           <a:p>
             <a:pPr algn="ctr"/>
             <a:r>
-              <a:rPr lang="en-US" altLang="zh-TW" sz="2400" dirty="0" smtClean="0"/>
+              <a:rPr lang="en-US" altLang="zh-TW" sz="2400" dirty="0"/>
               <a:t>Model 4</a:t>
             </a:r>
             <a:endParaRPr lang="zh-TW" altLang="en-US" sz="2400" dirty="0"/>
@@ -3854,7 +3850,7 @@
           <a:lstStyle/>
           <a:p>
             <a:r>
-              <a:rPr lang="en-US" altLang="zh-TW" sz="2400" dirty="0" smtClean="0"/>
+              <a:rPr lang="en-US" altLang="zh-TW" sz="2400" dirty="0"/>
               <a:t>y1</a:t>
             </a:r>
             <a:endParaRPr lang="zh-TW" altLang="en-US" sz="2400" dirty="0"/>
@@ -3992,7 +3988,7 @@
           <a:lstStyle/>
           <a:p>
             <a:r>
-              <a:rPr lang="en-US" altLang="zh-TW" sz="2400" dirty="0" smtClean="0"/>
+              <a:rPr lang="en-US" altLang="zh-TW" sz="2400" dirty="0"/>
               <a:t>y2</a:t>
             </a:r>
             <a:endParaRPr lang="zh-TW" altLang="en-US" sz="2400" dirty="0"/>
@@ -4022,7 +4018,7 @@
           <a:lstStyle/>
           <a:p>
             <a:r>
-              <a:rPr lang="en-US" altLang="zh-TW" sz="2400" dirty="0" smtClean="0"/>
+              <a:rPr lang="en-US" altLang="zh-TW" sz="2400" dirty="0"/>
               <a:t>y3</a:t>
             </a:r>
             <a:endParaRPr lang="zh-TW" altLang="en-US" sz="2400" dirty="0"/>
@@ -4052,7 +4048,7 @@
           <a:lstStyle/>
           <a:p>
             <a:r>
-              <a:rPr lang="en-US" altLang="zh-TW" sz="2400" dirty="0" smtClean="0"/>
+              <a:rPr lang="en-US" altLang="zh-TW" sz="2400" dirty="0"/>
               <a:t>y4</a:t>
             </a:r>
             <a:endParaRPr lang="zh-TW" altLang="en-US" sz="2400" dirty="0"/>
@@ -4121,7 +4117,7 @@
           <a:lstStyle/>
           <a:p>
             <a:r>
-              <a:rPr lang="en-US" altLang="zh-TW" sz="2000" dirty="0" smtClean="0"/>
+              <a:rPr lang="en-US" altLang="zh-TW" sz="2000" dirty="0"/>
               <a:t>Average / Voting</a:t>
             </a:r>
             <a:endParaRPr lang="zh-TW" altLang="en-US" sz="2000" dirty="0"/>
@@ -4164,7 +4160,7 @@
           <a:p>
             <a:pPr algn="ctr"/>
             <a:r>
-              <a:rPr lang="en-US" altLang="zh-TW" sz="2000" dirty="0" smtClean="0">
+              <a:rPr lang="en-US" altLang="zh-TW" sz="2000" dirty="0">
                 <a:solidFill>
                   <a:schemeClr val="tx1"/>
                 </a:solidFill>
@@ -4202,7 +4198,7 @@
           <a:lstStyle/>
           <a:p>
             <a:r>
-              <a:rPr lang="en-US" altLang="zh-TW" sz="4000" dirty="0" smtClean="0"/>
+              <a:rPr lang="en-US" altLang="zh-TW" sz="4000" dirty="0"/>
               <a:t>……</a:t>
             </a:r>
             <a:endParaRPr lang="zh-TW" altLang="en-US" sz="4000" dirty="0"/>
@@ -4323,7 +4319,7 @@
           <a:p>
             <a:pPr algn="ctr"/>
             <a:r>
-              <a:rPr lang="en-US" altLang="zh-TW" sz="2000" dirty="0" smtClean="0"/>
+              <a:rPr lang="en-US" altLang="zh-TW" sz="2000" dirty="0"/>
               <a:t>(Sample with replacement)</a:t>
             </a:r>
             <a:endParaRPr lang="zh-TW" altLang="en-US" sz="2000" dirty="0"/>
@@ -4354,7 +4350,7 @@
           <a:p>
             <a:pPr algn="ctr"/>
             <a:r>
-              <a:rPr lang="en-US" altLang="zh-TW" sz="2000" dirty="0" smtClean="0"/>
+              <a:rPr lang="en-US" altLang="zh-TW" sz="2000" dirty="0"/>
               <a:t>(Training)</a:t>
             </a:r>
             <a:endParaRPr lang="zh-TW" altLang="en-US" sz="2000" dirty="0"/>
@@ -4468,7 +4464,7 @@
           <a:lstStyle/>
           <a:p>
             <a:r>
-              <a:rPr lang="en-US" altLang="zh-TW" dirty="0" smtClean="0"/>
+              <a:rPr lang="en-US" altLang="zh-TW" dirty="0"/>
               <a:t>M1</a:t>
             </a:r>
             <a:endParaRPr lang="zh-TW" altLang="en-US" dirty="0"/>
@@ -4585,7 +4581,7 @@
           <a:lstStyle/>
           <a:p>
             <a:r>
-              <a:rPr lang="en-US" altLang="zh-TW" dirty="0" smtClean="0"/>
+              <a:rPr lang="en-US" altLang="zh-TW" dirty="0"/>
               <a:t>M2</a:t>
             </a:r>
             <a:endParaRPr lang="zh-TW" altLang="en-US" dirty="0"/>
@@ -4702,7 +4698,7 @@
           <a:lstStyle/>
           <a:p>
             <a:r>
-              <a:rPr lang="en-US" altLang="zh-TW" dirty="0" smtClean="0"/>
+              <a:rPr lang="en-US" altLang="zh-TW" dirty="0"/>
               <a:t>M3</a:t>
             </a:r>
             <a:endParaRPr lang="zh-TW" altLang="en-US" dirty="0"/>
@@ -4826,11 +4822,11 @@
           <a:p>
             <a:pPr algn="ctr"/>
             <a:r>
-              <a:rPr lang="zh-TW" altLang="en-US" sz="2000" dirty="0" smtClean="0"/>
+              <a:rPr lang="zh-TW" altLang="en-US" sz="2000" dirty="0"/>
               <a:t>建簡單的模型 </a:t>
             </a:r>
             <a:r>
-              <a:rPr lang="en-US" altLang="zh-TW" sz="2000" dirty="0" smtClean="0"/>
+              <a:rPr lang="en-US" altLang="zh-TW" sz="2000" dirty="0"/>
               <a:t>M1</a:t>
             </a:r>
             <a:endParaRPr lang="zh-TW" altLang="en-US" sz="2000" dirty="0"/>
@@ -4861,30 +4857,26 @@
           <a:p>
             <a:pPr algn="ctr"/>
             <a:r>
-              <a:rPr lang="zh-TW" altLang="en-US" sz="2000" dirty="0" smtClean="0"/>
+              <a:rPr lang="zh-TW" altLang="en-US" sz="2000" dirty="0"/>
               <a:t>被</a:t>
             </a:r>
             <a:r>
-              <a:rPr lang="en-US" altLang="zh-TW" sz="2000" dirty="0" smtClean="0"/>
+              <a:rPr lang="en-US" altLang="zh-TW" sz="2000" dirty="0"/>
               <a:t>M1</a:t>
             </a:r>
             <a:r>
-              <a:rPr lang="zh-TW" altLang="en-US" sz="2000" dirty="0" smtClean="0"/>
+              <a:rPr lang="zh-TW" altLang="en-US" sz="2000" dirty="0"/>
               <a:t>分錯的資料權重加大</a:t>
             </a:r>
-            <a:r>
-              <a:rPr lang="en-US" altLang="zh-TW" sz="2000" dirty="0" smtClean="0"/>
-              <a:t/>
-            </a:r>
             <a:br>
-              <a:rPr lang="en-US" altLang="zh-TW" sz="2000" dirty="0" smtClean="0"/>
+              <a:rPr lang="en-US" altLang="zh-TW" sz="2000" dirty="0"/>
             </a:br>
             <a:r>
-              <a:rPr lang="zh-TW" altLang="en-US" sz="2000" dirty="0" smtClean="0"/>
+              <a:rPr lang="zh-TW" altLang="en-US" sz="2000" dirty="0"/>
               <a:t>然後建 </a:t>
             </a:r>
             <a:r>
-              <a:rPr lang="en-US" altLang="zh-TW" sz="2000" dirty="0" smtClean="0"/>
+              <a:rPr lang="en-US" altLang="zh-TW" sz="2000" dirty="0"/>
               <a:t>M2</a:t>
             </a:r>
             <a:endParaRPr lang="zh-TW" altLang="en-US" sz="2000" dirty="0"/>
@@ -4914,30 +4906,26 @@
           <a:p>
             <a:pPr algn="ctr"/>
             <a:r>
-              <a:rPr lang="zh-TW" altLang="en-US" dirty="0" smtClean="0"/>
+              <a:rPr lang="zh-TW" altLang="en-US" dirty="0"/>
               <a:t>被</a:t>
             </a:r>
             <a:r>
-              <a:rPr lang="en-US" altLang="zh-TW" dirty="0" smtClean="0"/>
+              <a:rPr lang="en-US" altLang="zh-TW" dirty="0"/>
               <a:t>M2</a:t>
             </a:r>
             <a:r>
-              <a:rPr lang="zh-TW" altLang="en-US" dirty="0" smtClean="0"/>
+              <a:rPr lang="zh-TW" altLang="en-US" dirty="0"/>
               <a:t>分錯的資料權重加大</a:t>
             </a:r>
-            <a:r>
-              <a:rPr lang="en-US" altLang="zh-TW" dirty="0" smtClean="0"/>
-              <a:t/>
-            </a:r>
             <a:br>
-              <a:rPr lang="en-US" altLang="zh-TW" dirty="0" smtClean="0"/>
+              <a:rPr lang="en-US" altLang="zh-TW" dirty="0"/>
             </a:br>
             <a:r>
-              <a:rPr lang="zh-TW" altLang="en-US" dirty="0" smtClean="0"/>
+              <a:rPr lang="zh-TW" altLang="en-US" dirty="0"/>
               <a:t>然後建 </a:t>
             </a:r>
             <a:r>
-              <a:rPr lang="en-US" altLang="zh-TW" dirty="0" smtClean="0"/>
+              <a:rPr lang="en-US" altLang="zh-TW" dirty="0"/>
               <a:t>M3</a:t>
             </a:r>
             <a:endParaRPr lang="zh-TW" altLang="en-US" dirty="0"/>
@@ -4968,7 +4956,7 @@
           <a:p>
             <a:pPr algn="ctr"/>
             <a:r>
-              <a:rPr lang="en-US" altLang="zh-TW" sz="2000" dirty="0" smtClean="0"/>
+              <a:rPr lang="en-US" altLang="zh-TW" sz="2000" dirty="0"/>
               <a:t>M1 + M2 + M3</a:t>
             </a:r>
             <a:endParaRPr lang="zh-TW" altLang="en-US" sz="2000" dirty="0"/>
@@ -5005,90 +4993,18 @@
           <a:chExt cx="0" cy="0"/>
         </a:xfrm>
       </p:grpSpPr>
-      <p:sp>
-        <p:nvSpPr>
-          <p:cNvPr id="4" name="流程圖: 磁碟 3"/>
-          <p:cNvSpPr/>
-          <p:nvPr/>
-        </p:nvSpPr>
-        <p:spPr>
-          <a:xfrm>
-            <a:off x="3995936" y="116632"/>
-            <a:ext cx="2304256" cy="1008112"/>
-          </a:xfrm>
-          <a:prstGeom prst="flowChartMagneticDisk">
-            <a:avLst/>
-          </a:prstGeom>
-        </p:spPr>
-        <p:style>
-          <a:lnRef idx="1">
-            <a:schemeClr val="dk1"/>
-          </a:lnRef>
-          <a:fillRef idx="2">
-            <a:schemeClr val="dk1"/>
-          </a:fillRef>
-          <a:effectRef idx="1">
-            <a:schemeClr val="dk1"/>
-          </a:effectRef>
-          <a:fontRef idx="minor">
-            <a:schemeClr val="dk1"/>
-          </a:fontRef>
-        </p:style>
-        <p:txBody>
-          <a:bodyPr rtlCol="0" anchor="ctr"/>
-          <a:lstStyle/>
-          <a:p>
-            <a:pPr algn="ctr"/>
-            <a:r>
-              <a:rPr lang="en-US" altLang="zh-TW" sz="2400" dirty="0" smtClean="0"/>
-              <a:t>Train Data</a:t>
-            </a:r>
-            <a:endParaRPr lang="zh-TW" altLang="en-US" sz="2400" dirty="0"/>
-          </a:p>
-        </p:txBody>
-      </p:sp>
-      <p:sp>
-        <p:nvSpPr>
-          <p:cNvPr id="10" name="文字方塊 9"/>
-          <p:cNvSpPr txBox="1"/>
-          <p:nvPr/>
-        </p:nvSpPr>
-        <p:spPr>
-          <a:xfrm>
-            <a:off x="8151846" y="2204864"/>
-            <a:ext cx="1296144" cy="707886"/>
-          </a:xfrm>
-          <a:prstGeom prst="rect">
-            <a:avLst/>
-          </a:prstGeom>
-          <a:noFill/>
-        </p:spPr>
-        <p:txBody>
-          <a:bodyPr wrap="square" rtlCol="0">
-            <a:spAutoFit/>
-          </a:bodyPr>
-          <a:lstStyle/>
-          <a:p>
-            <a:r>
-              <a:rPr lang="en-US" altLang="zh-TW" sz="4000" dirty="0" smtClean="0"/>
-              <a:t>……</a:t>
-            </a:r>
-            <a:endParaRPr lang="zh-TW" altLang="en-US" sz="4000" dirty="0"/>
-          </a:p>
-        </p:txBody>
-      </p:sp>
       <p:cxnSp>
         <p:nvCxnSpPr>
           <p:cNvPr id="12" name="直線單箭頭接點 11"/>
           <p:cNvCxnSpPr>
-            <a:stCxn id="4" idx="3"/>
+            <a:cxnSpLocks/>
           </p:cNvCxnSpPr>
           <p:nvPr/>
         </p:nvCxnSpPr>
         <p:spPr>
           <a:xfrm flipH="1">
-            <a:off x="2087724" y="1124744"/>
-            <a:ext cx="3060340" cy="1224136"/>
+            <a:off x="3059832" y="764704"/>
+            <a:ext cx="1080120" cy="648072"/>
           </a:xfrm>
           <a:prstGeom prst="straightConnector1">
             <a:avLst/>
@@ -5116,14 +5032,14 @@
         <p:nvCxnSpPr>
           <p:cNvPr id="15" name="直線單箭頭接點 14"/>
           <p:cNvCxnSpPr>
-            <a:stCxn id="4" idx="3"/>
+            <a:cxnSpLocks/>
           </p:cNvCxnSpPr>
           <p:nvPr/>
         </p:nvCxnSpPr>
         <p:spPr>
-          <a:xfrm flipH="1">
-            <a:off x="3887924" y="1124744"/>
-            <a:ext cx="1260140" cy="1224136"/>
+          <a:xfrm>
+            <a:off x="4806026" y="764704"/>
+            <a:ext cx="0" cy="648072"/>
           </a:xfrm>
           <a:prstGeom prst="straightConnector1">
             <a:avLst/>
@@ -5151,14 +5067,14 @@
         <p:nvCxnSpPr>
           <p:cNvPr id="18" name="直線單箭頭接點 17"/>
           <p:cNvCxnSpPr>
-            <a:stCxn id="4" idx="3"/>
+            <a:cxnSpLocks/>
           </p:cNvCxnSpPr>
           <p:nvPr/>
         </p:nvCxnSpPr>
         <p:spPr>
           <a:xfrm>
-            <a:off x="5148064" y="1124744"/>
-            <a:ext cx="468052" cy="1224136"/>
+            <a:off x="5580112" y="764704"/>
+            <a:ext cx="959889" cy="576064"/>
           </a:xfrm>
           <a:prstGeom prst="straightConnector1">
             <a:avLst/>
@@ -5182,41 +5098,6 @@
           </a:fontRef>
         </p:style>
       </p:cxnSp>
-      <p:cxnSp>
-        <p:nvCxnSpPr>
-          <p:cNvPr id="21" name="直線單箭頭接點 20"/>
-          <p:cNvCxnSpPr>
-            <a:stCxn id="4" idx="3"/>
-          </p:cNvCxnSpPr>
-          <p:nvPr/>
-        </p:nvCxnSpPr>
-        <p:spPr>
-          <a:xfrm>
-            <a:off x="5148064" y="1124744"/>
-            <a:ext cx="2052228" cy="1224136"/>
-          </a:xfrm>
-          <a:prstGeom prst="straightConnector1">
-            <a:avLst/>
-          </a:prstGeom>
-          <a:ln w="28575">
-            <a:tailEnd type="arrow"/>
-          </a:ln>
-        </p:spPr>
-        <p:style>
-          <a:lnRef idx="1">
-            <a:schemeClr val="dk1"/>
-          </a:lnRef>
-          <a:fillRef idx="0">
-            <a:schemeClr val="dk1"/>
-          </a:fillRef>
-          <a:effectRef idx="0">
-            <a:schemeClr val="dk1"/>
-          </a:effectRef>
-          <a:fontRef idx="minor">
-            <a:schemeClr val="tx1"/>
-          </a:fontRef>
-        </p:style>
-      </p:cxnSp>
       <p:sp>
         <p:nvSpPr>
           <p:cNvPr id="24" name="流程圖: 程序 23"/>
@@ -5225,7 +5106,7 @@
         </p:nvSpPr>
         <p:spPr>
           <a:xfrm>
-            <a:off x="1403648" y="2420888"/>
+            <a:off x="2339752" y="1449589"/>
             <a:ext cx="1368152" cy="720080"/>
           </a:xfrm>
           <a:prstGeom prst="flowChartProcess">
@@ -5252,10 +5133,17 @@
           <a:p>
             <a:pPr algn="ctr"/>
             <a:r>
-              <a:rPr lang="en-US" altLang="zh-TW" sz="2400" dirty="0" smtClean="0"/>
+              <a:rPr lang="en-US" altLang="zh-TW" sz="2400" dirty="0"/>
               <a:t>Model 1</a:t>
             </a:r>
-            <a:endParaRPr lang="zh-TW" altLang="en-US" sz="2400" dirty="0"/>
+          </a:p>
+          <a:p>
+            <a:pPr algn="ctr"/>
+            <a:r>
+              <a:rPr lang="en-US" altLang="zh-TW" sz="1200" dirty="0"/>
+              <a:t>(linear regression)</a:t>
+            </a:r>
+            <a:endParaRPr lang="zh-TW" altLang="en-US" sz="1200" dirty="0"/>
           </a:p>
         </p:txBody>
       </p:sp>
@@ -5267,7 +5155,7 @@
         </p:nvSpPr>
         <p:spPr>
           <a:xfrm>
-            <a:off x="3203848" y="2420888"/>
+            <a:off x="4139952" y="1449589"/>
             <a:ext cx="1368152" cy="720080"/>
           </a:xfrm>
           <a:prstGeom prst="flowChartProcess">
@@ -5294,10 +5182,17 @@
           <a:p>
             <a:pPr algn="ctr"/>
             <a:r>
-              <a:rPr lang="en-US" altLang="zh-TW" sz="2400" dirty="0" smtClean="0"/>
+              <a:rPr lang="en-US" altLang="zh-TW" sz="2400" dirty="0"/>
               <a:t>Model 2</a:t>
             </a:r>
-            <a:endParaRPr lang="zh-TW" altLang="en-US" sz="2400" dirty="0"/>
+          </a:p>
+          <a:p>
+            <a:pPr algn="ctr"/>
+            <a:r>
+              <a:rPr lang="en-US" altLang="zh-TW" sz="1200" dirty="0"/>
+              <a:t>(SVR)</a:t>
+            </a:r>
+            <a:endParaRPr lang="zh-TW" altLang="en-US" sz="1200" dirty="0"/>
           </a:p>
         </p:txBody>
       </p:sp>
@@ -5309,7 +5204,7 @@
         </p:nvSpPr>
         <p:spPr>
           <a:xfrm>
-            <a:off x="4932040" y="2420888"/>
+            <a:off x="5868144" y="1449589"/>
             <a:ext cx="1368152" cy="720080"/>
           </a:xfrm>
           <a:prstGeom prst="flowChartProcess">
@@ -5336,52 +5231,17 @@
           <a:p>
             <a:pPr algn="ctr"/>
             <a:r>
-              <a:rPr lang="en-US" altLang="zh-TW" sz="2400" dirty="0" smtClean="0"/>
+              <a:rPr lang="en-US" altLang="zh-TW" sz="2400" dirty="0"/>
               <a:t>Model 3</a:t>
             </a:r>
-            <a:endParaRPr lang="zh-TW" altLang="en-US" sz="2400" dirty="0"/>
-          </a:p>
-        </p:txBody>
-      </p:sp>
-      <p:sp>
-        <p:nvSpPr>
-          <p:cNvPr id="38" name="流程圖: 程序 37"/>
-          <p:cNvSpPr/>
-          <p:nvPr/>
-        </p:nvSpPr>
-        <p:spPr>
-          <a:xfrm>
-            <a:off x="6516216" y="2420888"/>
-            <a:ext cx="1368152" cy="720080"/>
-          </a:xfrm>
-          <a:prstGeom prst="flowChartProcess">
-            <a:avLst/>
-          </a:prstGeom>
-        </p:spPr>
-        <p:style>
-          <a:lnRef idx="1">
-            <a:schemeClr val="accent4"/>
-          </a:lnRef>
-          <a:fillRef idx="2">
-            <a:schemeClr val="accent4"/>
-          </a:fillRef>
-          <a:effectRef idx="1">
-            <a:schemeClr val="accent4"/>
-          </a:effectRef>
-          <a:fontRef idx="minor">
-            <a:schemeClr val="dk1"/>
-          </a:fontRef>
-        </p:style>
-        <p:txBody>
-          <a:bodyPr rtlCol="0" anchor="ctr"/>
-          <a:lstStyle/>
+          </a:p>
           <a:p>
             <a:pPr algn="ctr"/>
             <a:r>
-              <a:rPr lang="en-US" altLang="zh-TW" sz="2400" dirty="0" smtClean="0"/>
-              <a:t>Model 4</a:t>
-            </a:r>
-            <a:endParaRPr lang="zh-TW" altLang="en-US" sz="2400" dirty="0"/>
+              <a:rPr lang="en-US" altLang="zh-TW" sz="1200" dirty="0"/>
+              <a:t>(CART)</a:t>
+            </a:r>
+            <a:endParaRPr lang="zh-TW" altLang="en-US" sz="1200" dirty="0"/>
           </a:p>
         </p:txBody>
       </p:sp>
@@ -5393,13 +5253,18 @@
         </p:nvSpPr>
         <p:spPr>
           <a:xfrm>
-            <a:off x="1847915" y="3717032"/>
+            <a:off x="2771800" y="2745733"/>
             <a:ext cx="479618" cy="461665"/>
           </a:xfrm>
           <a:prstGeom prst="rect">
             <a:avLst/>
           </a:prstGeom>
           <a:noFill/>
+          <a:ln>
+            <a:solidFill>
+              <a:schemeClr val="tx1"/>
+            </a:solidFill>
+          </a:ln>
         </p:spPr>
         <p:txBody>
           <a:bodyPr wrap="none" rtlCol="0">
@@ -5408,7 +5273,7 @@
           <a:lstStyle/>
           <a:p>
             <a:r>
-              <a:rPr lang="en-US" altLang="zh-TW" sz="2400" dirty="0" smtClean="0"/>
+              <a:rPr lang="en-US" altLang="zh-TW" sz="2400" dirty="0"/>
               <a:t>y1</a:t>
             </a:r>
             <a:endParaRPr lang="zh-TW" altLang="en-US" sz="2400" dirty="0"/>
@@ -5419,15 +5284,16 @@
         <p:nvCxnSpPr>
           <p:cNvPr id="52" name="直線單箭頭接點 51"/>
           <p:cNvCxnSpPr>
+            <a:cxnSpLocks/>
             <a:stCxn id="29" idx="2"/>
             <a:endCxn id="58" idx="0"/>
           </p:cNvCxnSpPr>
           <p:nvPr/>
         </p:nvCxnSpPr>
         <p:spPr>
-          <a:xfrm>
-            <a:off x="3887924" y="3140968"/>
-            <a:ext cx="0" cy="576064"/>
+          <a:xfrm flipH="1">
+            <a:off x="4811809" y="2169669"/>
+            <a:ext cx="12219" cy="576064"/>
           </a:xfrm>
           <a:prstGeom prst="straightConnector1">
             <a:avLst/>
@@ -5461,9 +5327,9 @@
           <p:nvPr/>
         </p:nvCxnSpPr>
         <p:spPr>
-          <a:xfrm>
-            <a:off x="5616116" y="3140968"/>
-            <a:ext cx="0" cy="576064"/>
+          <a:xfrm flipH="1">
+            <a:off x="6540001" y="2169669"/>
+            <a:ext cx="12219" cy="576064"/>
           </a:xfrm>
           <a:prstGeom prst="straightConnector1">
             <a:avLst/>
@@ -5487,42 +5353,6 @@
           </a:fontRef>
         </p:style>
       </p:cxnSp>
-      <p:cxnSp>
-        <p:nvCxnSpPr>
-          <p:cNvPr id="56" name="直線單箭頭接點 55"/>
-          <p:cNvCxnSpPr>
-            <a:stCxn id="38" idx="2"/>
-            <a:endCxn id="62" idx="0"/>
-          </p:cNvCxnSpPr>
-          <p:nvPr/>
-        </p:nvCxnSpPr>
-        <p:spPr>
-          <a:xfrm>
-            <a:off x="7200292" y="3140968"/>
-            <a:ext cx="0" cy="576064"/>
-          </a:xfrm>
-          <a:prstGeom prst="straightConnector1">
-            <a:avLst/>
-          </a:prstGeom>
-          <a:ln w="28575">
-            <a:tailEnd type="arrow"/>
-          </a:ln>
-        </p:spPr>
-        <p:style>
-          <a:lnRef idx="1">
-            <a:schemeClr val="dk1"/>
-          </a:lnRef>
-          <a:fillRef idx="0">
-            <a:schemeClr val="dk1"/>
-          </a:fillRef>
-          <a:effectRef idx="0">
-            <a:schemeClr val="dk1"/>
-          </a:effectRef>
-          <a:fontRef idx="minor">
-            <a:schemeClr val="tx1"/>
-          </a:fontRef>
-        </p:style>
-      </p:cxnSp>
       <p:sp>
         <p:nvSpPr>
           <p:cNvPr id="58" name="文字方塊 57"/>
@@ -5531,13 +5361,18 @@
         </p:nvSpPr>
         <p:spPr>
           <a:xfrm>
-            <a:off x="3648115" y="3717032"/>
+            <a:off x="4572000" y="2745733"/>
             <a:ext cx="479618" cy="461665"/>
           </a:xfrm>
           <a:prstGeom prst="rect">
             <a:avLst/>
           </a:prstGeom>
           <a:noFill/>
+          <a:ln>
+            <a:solidFill>
+              <a:schemeClr val="tx1"/>
+            </a:solidFill>
+          </a:ln>
         </p:spPr>
         <p:txBody>
           <a:bodyPr wrap="none" rtlCol="0">
@@ -5546,7 +5381,7 @@
           <a:lstStyle/>
           <a:p>
             <a:r>
-              <a:rPr lang="en-US" altLang="zh-TW" sz="2400" dirty="0" smtClean="0"/>
+              <a:rPr lang="en-US" altLang="zh-TW" sz="2400" dirty="0"/>
               <a:t>y2</a:t>
             </a:r>
             <a:endParaRPr lang="zh-TW" altLang="en-US" sz="2400" dirty="0"/>
@@ -5561,13 +5396,18 @@
         </p:nvSpPr>
         <p:spPr>
           <a:xfrm>
-            <a:off x="5376307" y="3717032"/>
+            <a:off x="6300192" y="2745733"/>
             <a:ext cx="479618" cy="461665"/>
           </a:xfrm>
           <a:prstGeom prst="rect">
             <a:avLst/>
           </a:prstGeom>
           <a:noFill/>
+          <a:ln>
+            <a:solidFill>
+              <a:schemeClr val="tx1"/>
+            </a:solidFill>
+          </a:ln>
         </p:spPr>
         <p:txBody>
           <a:bodyPr wrap="none" rtlCol="0">
@@ -5576,70 +5416,10 @@
           <a:lstStyle/>
           <a:p>
             <a:r>
-              <a:rPr lang="en-US" altLang="zh-TW" sz="2400" dirty="0" smtClean="0"/>
+              <a:rPr lang="en-US" altLang="zh-TW" sz="2400" dirty="0"/>
               <a:t>y3</a:t>
             </a:r>
             <a:endParaRPr lang="zh-TW" altLang="en-US" sz="2400" dirty="0"/>
-          </a:p>
-        </p:txBody>
-      </p:sp>
-      <p:sp>
-        <p:nvSpPr>
-          <p:cNvPr id="62" name="文字方塊 61"/>
-          <p:cNvSpPr txBox="1"/>
-          <p:nvPr/>
-        </p:nvSpPr>
-        <p:spPr>
-          <a:xfrm>
-            <a:off x="6960483" y="3717032"/>
-            <a:ext cx="479618" cy="461665"/>
-          </a:xfrm>
-          <a:prstGeom prst="rect">
-            <a:avLst/>
-          </a:prstGeom>
-          <a:noFill/>
-        </p:spPr>
-        <p:txBody>
-          <a:bodyPr wrap="none" rtlCol="0">
-            <a:spAutoFit/>
-          </a:bodyPr>
-          <a:lstStyle/>
-          <a:p>
-            <a:r>
-              <a:rPr lang="en-US" altLang="zh-TW" sz="2400" dirty="0" smtClean="0"/>
-              <a:t>y4</a:t>
-            </a:r>
-            <a:endParaRPr lang="zh-TW" altLang="en-US" sz="2400" dirty="0"/>
-          </a:p>
-        </p:txBody>
-      </p:sp>
-      <p:sp>
-        <p:nvSpPr>
-          <p:cNvPr id="67" name="文字方塊 66"/>
-          <p:cNvSpPr txBox="1"/>
-          <p:nvPr/>
-        </p:nvSpPr>
-        <p:spPr>
-          <a:xfrm>
-            <a:off x="8151846" y="3788773"/>
-            <a:ext cx="1296144" cy="707886"/>
-          </a:xfrm>
-          <a:prstGeom prst="rect">
-            <a:avLst/>
-          </a:prstGeom>
-          <a:noFill/>
-        </p:spPr>
-        <p:txBody>
-          <a:bodyPr wrap="square" rtlCol="0">
-            <a:spAutoFit/>
-          </a:bodyPr>
-          <a:lstStyle/>
-          <a:p>
-            <a:r>
-              <a:rPr lang="en-US" altLang="zh-TW" sz="4000" dirty="0" smtClean="0"/>
-              <a:t>……</a:t>
-            </a:r>
-            <a:endParaRPr lang="zh-TW" altLang="en-US" sz="4000" dirty="0"/>
           </a:p>
         </p:txBody>
       </p:sp>
@@ -5653,9 +5433,9 @@
           <p:nvPr/>
         </p:nvCxnSpPr>
         <p:spPr>
-          <a:xfrm>
-            <a:off x="2087724" y="3140968"/>
-            <a:ext cx="0" cy="576064"/>
+          <a:xfrm flipH="1">
+            <a:off x="3011609" y="2169669"/>
+            <a:ext cx="12219" cy="576064"/>
           </a:xfrm>
           <a:prstGeom prst="straightConnector1">
             <a:avLst/>
@@ -5679,198 +5459,19 @@
           </a:fontRef>
         </p:style>
       </p:cxnSp>
-      <p:sp>
-        <p:nvSpPr>
-          <p:cNvPr id="40" name="流程圖: 磁碟 39"/>
-          <p:cNvSpPr/>
-          <p:nvPr/>
-        </p:nvSpPr>
-        <p:spPr>
-          <a:xfrm>
-            <a:off x="-547725" y="2484173"/>
-            <a:ext cx="1303301" cy="593509"/>
-          </a:xfrm>
-          <a:prstGeom prst="flowChartMagneticDisk">
-            <a:avLst/>
-          </a:prstGeom>
-          <a:ln/>
-        </p:spPr>
-        <p:style>
-          <a:lnRef idx="2">
-            <a:schemeClr val="dk1"/>
-          </a:lnRef>
-          <a:fillRef idx="1">
-            <a:schemeClr val="lt1"/>
-          </a:fillRef>
-          <a:effectRef idx="0">
-            <a:schemeClr val="dk1"/>
-          </a:effectRef>
-          <a:fontRef idx="minor">
-            <a:schemeClr val="dk1"/>
-          </a:fontRef>
-        </p:style>
-        <p:txBody>
-          <a:bodyPr rtlCol="0" anchor="ctr"/>
-          <a:lstStyle/>
-          <a:p>
-            <a:pPr algn="ctr"/>
-            <a:r>
-              <a:rPr lang="en-US" altLang="zh-TW" sz="2000" dirty="0" smtClean="0">
-                <a:solidFill>
-                  <a:schemeClr val="tx1"/>
-                </a:solidFill>
-              </a:rPr>
-              <a:t>Test Data</a:t>
-            </a:r>
-            <a:endParaRPr lang="zh-TW" altLang="en-US" sz="2000" dirty="0">
-              <a:solidFill>
-                <a:schemeClr val="tx1"/>
-              </a:solidFill>
-            </a:endParaRPr>
-          </a:p>
-        </p:txBody>
-      </p:sp>
-      <p:sp>
-        <p:nvSpPr>
-          <p:cNvPr id="41" name="矩形 40"/>
-          <p:cNvSpPr/>
-          <p:nvPr/>
-        </p:nvSpPr>
-        <p:spPr>
-          <a:xfrm>
-            <a:off x="1159599" y="2312742"/>
-            <a:ext cx="7976930" cy="936371"/>
-          </a:xfrm>
-          <a:prstGeom prst="rect">
-            <a:avLst/>
-          </a:prstGeom>
-          <a:solidFill>
-            <a:schemeClr val="accent1">
-              <a:alpha val="0"/>
-            </a:schemeClr>
-          </a:solidFill>
-          <a:ln>
-            <a:solidFill>
-              <a:srgbClr val="C00000"/>
-            </a:solidFill>
-            <a:prstDash val="dash"/>
-          </a:ln>
-        </p:spPr>
-        <p:style>
-          <a:lnRef idx="2">
-            <a:schemeClr val="accent1">
-              <a:shade val="50000"/>
-            </a:schemeClr>
-          </a:lnRef>
-          <a:fillRef idx="1">
-            <a:schemeClr val="accent1"/>
-          </a:fillRef>
-          <a:effectRef idx="0">
-            <a:schemeClr val="accent1"/>
-          </a:effectRef>
-          <a:fontRef idx="minor">
-            <a:schemeClr val="lt1"/>
-          </a:fontRef>
-        </p:style>
-        <p:txBody>
-          <a:bodyPr rtlCol="0" anchor="ctr"/>
-          <a:lstStyle/>
-          <a:p>
-            <a:pPr algn="ctr"/>
-            <a:endParaRPr lang="zh-TW" altLang="en-US"/>
-          </a:p>
-        </p:txBody>
-      </p:sp>
-      <p:cxnSp>
-        <p:nvCxnSpPr>
-          <p:cNvPr id="42" name="直線單箭頭接點 41"/>
-          <p:cNvCxnSpPr>
-            <a:stCxn id="40" idx="4"/>
-            <a:endCxn id="41" idx="1"/>
-          </p:cNvCxnSpPr>
-          <p:nvPr/>
-        </p:nvCxnSpPr>
-        <p:spPr>
-          <a:xfrm>
-            <a:off x="755576" y="2780928"/>
-            <a:ext cx="404023" cy="0"/>
-          </a:xfrm>
-          <a:prstGeom prst="straightConnector1">
-            <a:avLst/>
-          </a:prstGeom>
-          <a:ln w="28575">
-            <a:solidFill>
-              <a:schemeClr val="tx1"/>
-            </a:solidFill>
-            <a:tailEnd type="arrow"/>
-          </a:ln>
-        </p:spPr>
-        <p:style>
-          <a:lnRef idx="1">
-            <a:schemeClr val="dk1"/>
-          </a:lnRef>
-          <a:fillRef idx="0">
-            <a:schemeClr val="dk1"/>
-          </a:fillRef>
-          <a:effectRef idx="0">
-            <a:schemeClr val="dk1"/>
-          </a:effectRef>
-          <a:fontRef idx="minor">
-            <a:schemeClr val="tx1"/>
-          </a:fontRef>
-        </p:style>
-      </p:cxnSp>
-      <p:sp>
-        <p:nvSpPr>
-          <p:cNvPr id="13" name="等腰三角形 12"/>
-          <p:cNvSpPr/>
-          <p:nvPr/>
-        </p:nvSpPr>
-        <p:spPr>
-          <a:xfrm rot="10800000">
-            <a:off x="3059832" y="4797151"/>
-            <a:ext cx="3528392" cy="576063"/>
-          </a:xfrm>
-          <a:prstGeom prst="triangle">
-            <a:avLst/>
-          </a:prstGeom>
-        </p:spPr>
-        <p:style>
-          <a:lnRef idx="2">
-            <a:schemeClr val="accent6"/>
-          </a:lnRef>
-          <a:fillRef idx="1">
-            <a:schemeClr val="lt1"/>
-          </a:fillRef>
-          <a:effectRef idx="0">
-            <a:schemeClr val="accent6"/>
-          </a:effectRef>
-          <a:fontRef idx="minor">
-            <a:schemeClr val="dk1"/>
-          </a:fontRef>
-        </p:style>
-        <p:txBody>
-          <a:bodyPr rtlCol="0" anchor="ctr"/>
-          <a:lstStyle/>
-          <a:p>
-            <a:pPr algn="ctr"/>
-            <a:endParaRPr lang="zh-TW" altLang="en-US" dirty="0"/>
-          </a:p>
-        </p:txBody>
-      </p:sp>
       <p:cxnSp>
         <p:nvCxnSpPr>
           <p:cNvPr id="46" name="直線單箭頭接點 45"/>
           <p:cNvCxnSpPr>
+            <a:cxnSpLocks/>
             <a:stCxn id="48" idx="2"/>
-            <a:endCxn id="13" idx="3"/>
           </p:cNvCxnSpPr>
           <p:nvPr/>
         </p:nvCxnSpPr>
         <p:spPr>
           <a:xfrm>
-            <a:off x="2087724" y="4178697"/>
-            <a:ext cx="2736304" cy="618454"/>
+            <a:off x="3011609" y="3207398"/>
+            <a:ext cx="336255" cy="509634"/>
           </a:xfrm>
           <a:prstGeom prst="straightConnector1">
             <a:avLst/>
@@ -5898,15 +5499,15 @@
         <p:nvCxnSpPr>
           <p:cNvPr id="49" name="直線單箭頭接點 48"/>
           <p:cNvCxnSpPr>
+            <a:cxnSpLocks/>
             <a:stCxn id="58" idx="2"/>
-            <a:endCxn id="13" idx="3"/>
           </p:cNvCxnSpPr>
           <p:nvPr/>
         </p:nvCxnSpPr>
         <p:spPr>
-          <a:xfrm>
-            <a:off x="3887924" y="4178697"/>
-            <a:ext cx="936104" cy="618454"/>
+          <a:xfrm flipH="1">
+            <a:off x="4806026" y="3207398"/>
+            <a:ext cx="5783" cy="509634"/>
           </a:xfrm>
           <a:prstGeom prst="straightConnector1">
             <a:avLst/>
@@ -5934,15 +5535,15 @@
         <p:nvCxnSpPr>
           <p:cNvPr id="51" name="直線單箭頭接點 50"/>
           <p:cNvCxnSpPr>
+            <a:cxnSpLocks/>
             <a:stCxn id="60" idx="2"/>
-            <a:endCxn id="13" idx="3"/>
           </p:cNvCxnSpPr>
           <p:nvPr/>
         </p:nvCxnSpPr>
         <p:spPr>
           <a:xfrm flipH="1">
-            <a:off x="4824028" y="4178697"/>
-            <a:ext cx="792088" cy="618454"/>
+            <a:off x="6417205" y="3207398"/>
+            <a:ext cx="122796" cy="509634"/>
           </a:xfrm>
           <a:prstGeom prst="straightConnector1">
             <a:avLst/>
@@ -5966,57 +5567,26 @@
           </a:fontRef>
         </p:style>
       </p:cxnSp>
-      <p:cxnSp>
-        <p:nvCxnSpPr>
-          <p:cNvPr id="53" name="直線單箭頭接點 52"/>
-          <p:cNvCxnSpPr>
-            <a:stCxn id="62" idx="2"/>
-            <a:endCxn id="13" idx="3"/>
-          </p:cNvCxnSpPr>
-          <p:nvPr/>
-        </p:nvCxnSpPr>
-        <p:spPr>
-          <a:xfrm flipH="1">
-            <a:off x="4824028" y="4178697"/>
-            <a:ext cx="2376264" cy="618454"/>
-          </a:xfrm>
-          <a:prstGeom prst="straightConnector1">
-            <a:avLst/>
-          </a:prstGeom>
-          <a:ln w="28575">
-            <a:tailEnd type="arrow"/>
+      <p:sp>
+        <p:nvSpPr>
+          <p:cNvPr id="63" name="文字方塊 62"/>
+          <p:cNvSpPr txBox="1"/>
+          <p:nvPr/>
+        </p:nvSpPr>
+        <p:spPr>
+          <a:xfrm>
+            <a:off x="4372276" y="4832349"/>
+            <a:ext cx="919804" cy="461665"/>
+          </a:xfrm>
+          <a:prstGeom prst="rect">
+            <a:avLst/>
+          </a:prstGeom>
+          <a:noFill/>
+          <a:ln>
+            <a:solidFill>
+              <a:schemeClr val="tx1"/>
+            </a:solidFill>
           </a:ln>
-        </p:spPr>
-        <p:style>
-          <a:lnRef idx="1">
-            <a:schemeClr val="dk1"/>
-          </a:lnRef>
-          <a:fillRef idx="0">
-            <a:schemeClr val="dk1"/>
-          </a:fillRef>
-          <a:effectRef idx="0">
-            <a:schemeClr val="dk1"/>
-          </a:effectRef>
-          <a:fontRef idx="minor">
-            <a:schemeClr val="tx1"/>
-          </a:fontRef>
-        </p:style>
-      </p:cxnSp>
-      <p:sp>
-        <p:nvSpPr>
-          <p:cNvPr id="33" name="文字方塊 32"/>
-          <p:cNvSpPr txBox="1"/>
-          <p:nvPr/>
-        </p:nvSpPr>
-        <p:spPr>
-          <a:xfrm>
-            <a:off x="4152626" y="4814033"/>
-            <a:ext cx="1360437" cy="369332"/>
-          </a:xfrm>
-          <a:prstGeom prst="rect">
-            <a:avLst/>
-          </a:prstGeom>
-          <a:noFill/>
         </p:spPr>
         <p:txBody>
           <a:bodyPr wrap="none" rtlCol="0">
@@ -6025,45 +5595,7 @@
           <a:lstStyle/>
           <a:p>
             <a:r>
-              <a:rPr lang="en-US" altLang="zh-TW" dirty="0" smtClean="0">
-                <a:solidFill>
-                  <a:schemeClr val="accent6"/>
-                </a:solidFill>
-              </a:rPr>
-              <a:t>Meta-Model</a:t>
-            </a:r>
-            <a:endParaRPr lang="zh-TW" altLang="en-US" dirty="0">
-              <a:solidFill>
-                <a:schemeClr val="accent6"/>
-              </a:solidFill>
-            </a:endParaRPr>
-          </a:p>
-        </p:txBody>
-      </p:sp>
-      <p:sp>
-        <p:nvSpPr>
-          <p:cNvPr id="63" name="文字方塊 62"/>
-          <p:cNvSpPr txBox="1"/>
-          <p:nvPr/>
-        </p:nvSpPr>
-        <p:spPr>
-          <a:xfrm>
-            <a:off x="4372276" y="5703639"/>
-            <a:ext cx="919804" cy="461665"/>
-          </a:xfrm>
-          <a:prstGeom prst="rect">
-            <a:avLst/>
-          </a:prstGeom>
-          <a:noFill/>
-        </p:spPr>
-        <p:txBody>
-          <a:bodyPr wrap="none" rtlCol="0">
-            <a:spAutoFit/>
-          </a:bodyPr>
-          <a:lstStyle/>
-          <a:p>
-            <a:r>
-              <a:rPr lang="en-US" altLang="zh-TW" sz="2400" dirty="0" err="1" smtClean="0"/>
+              <a:rPr lang="en-US" altLang="zh-TW" sz="2400" dirty="0"/>
               <a:t>y.final</a:t>
             </a:r>
             <a:endParaRPr lang="zh-TW" altLang="en-US" sz="2400" dirty="0"/>
@@ -6074,14 +5606,14 @@
         <p:nvCxnSpPr>
           <p:cNvPr id="70" name="直線單箭頭接點 69"/>
           <p:cNvCxnSpPr>
-            <a:stCxn id="13" idx="0"/>
+            <a:cxnSpLocks/>
             <a:endCxn id="63" idx="0"/>
           </p:cNvCxnSpPr>
           <p:nvPr/>
         </p:nvCxnSpPr>
         <p:spPr>
           <a:xfrm>
-            <a:off x="4824028" y="5373214"/>
+            <a:off x="4824028" y="4501924"/>
             <a:ext cx="8150" cy="330425"/>
           </a:xfrm>
           <a:prstGeom prst="straightConnector1">
@@ -6106,6 +5638,189 @@
           </a:fontRef>
         </p:style>
       </p:cxnSp>
+      <p:sp>
+        <p:nvSpPr>
+          <p:cNvPr id="2" name="矩形 1">
+            <a:extLst>
+              <a:ext uri="{FF2B5EF4-FFF2-40B4-BE49-F238E27FC236}">
+                <a16:creationId xmlns:a16="http://schemas.microsoft.com/office/drawing/2014/main" id="{91BDF42B-0475-41BB-85B6-1FF0B3A4FE14}"/>
+              </a:ext>
+            </a:extLst>
+          </p:cNvPr>
+          <p:cNvSpPr/>
+          <p:nvPr/>
+        </p:nvSpPr>
+        <p:spPr>
+          <a:xfrm>
+            <a:off x="3995936" y="116632"/>
+            <a:ext cx="1620180" cy="576064"/>
+          </a:xfrm>
+          <a:prstGeom prst="rect">
+            <a:avLst/>
+          </a:prstGeom>
+        </p:spPr>
+        <p:style>
+          <a:lnRef idx="1">
+            <a:schemeClr val="dk1"/>
+          </a:lnRef>
+          <a:fillRef idx="2">
+            <a:schemeClr val="dk1"/>
+          </a:fillRef>
+          <a:effectRef idx="1">
+            <a:schemeClr val="dk1"/>
+          </a:effectRef>
+          <a:fontRef idx="minor">
+            <a:schemeClr val="dk1"/>
+          </a:fontRef>
+        </p:style>
+        <p:txBody>
+          <a:bodyPr rtlCol="0" anchor="ctr"/>
+          <a:lstStyle/>
+          <a:p>
+            <a:pPr algn="ctr"/>
+            <a:r>
+              <a:rPr lang="en-US" altLang="zh-TW" dirty="0"/>
+              <a:t>New observation</a:t>
+            </a:r>
+            <a:endParaRPr lang="zh-TW" altLang="en-US" dirty="0"/>
+          </a:p>
+        </p:txBody>
+      </p:sp>
+      <p:sp>
+        <p:nvSpPr>
+          <p:cNvPr id="37" name="流程圖: 程序 36">
+            <a:extLst>
+              <a:ext uri="{FF2B5EF4-FFF2-40B4-BE49-F238E27FC236}">
+                <a16:creationId xmlns:a16="http://schemas.microsoft.com/office/drawing/2014/main" id="{36BC64BB-F69D-4CD3-ACEA-427E8363E253}"/>
+              </a:ext>
+            </a:extLst>
+          </p:cNvPr>
+          <p:cNvSpPr/>
+          <p:nvPr/>
+        </p:nvSpPr>
+        <p:spPr>
+          <a:xfrm>
+            <a:off x="3230851" y="3789040"/>
+            <a:ext cx="3186354" cy="720080"/>
+          </a:xfrm>
+          <a:prstGeom prst="flowChartProcess">
+            <a:avLst/>
+          </a:prstGeom>
+          <a:solidFill>
+            <a:schemeClr val="accent6">
+              <a:alpha val="50000"/>
+            </a:schemeClr>
+          </a:solidFill>
+          <a:ln>
+            <a:noFill/>
+          </a:ln>
+        </p:spPr>
+        <p:style>
+          <a:lnRef idx="0">
+            <a:scrgbClr r="0" g="0" b="0"/>
+          </a:lnRef>
+          <a:fillRef idx="0">
+            <a:scrgbClr r="0" g="0" b="0"/>
+          </a:fillRef>
+          <a:effectRef idx="0">
+            <a:scrgbClr r="0" g="0" b="0"/>
+          </a:effectRef>
+          <a:fontRef idx="minor">
+            <a:schemeClr val="lt1"/>
+          </a:fontRef>
+        </p:style>
+        <p:txBody>
+          <a:bodyPr rtlCol="0" anchor="ctr"/>
+          <a:lstStyle/>
+          <a:p>
+            <a:pPr algn="ctr"/>
+            <a:r>
+              <a:rPr lang="en-US" altLang="zh-TW" sz="2400" dirty="0"/>
+              <a:t>Meta-Model</a:t>
+            </a:r>
+          </a:p>
+          <a:p>
+            <a:pPr algn="ctr"/>
+            <a:r>
+              <a:rPr lang="en-US" altLang="zh-TW" sz="2400" dirty="0"/>
+              <a:t>(Blender / meta learner)</a:t>
+            </a:r>
+            <a:endParaRPr lang="zh-TW" altLang="en-US" sz="2400" dirty="0"/>
+          </a:p>
+        </p:txBody>
+      </p:sp>
+      <p:sp>
+        <p:nvSpPr>
+          <p:cNvPr id="19" name="文字方塊 18">
+            <a:extLst>
+              <a:ext uri="{FF2B5EF4-FFF2-40B4-BE49-F238E27FC236}">
+                <a16:creationId xmlns:a16="http://schemas.microsoft.com/office/drawing/2014/main" id="{7155E67E-5C6B-47BB-997C-672D84B7040B}"/>
+              </a:ext>
+            </a:extLst>
+          </p:cNvPr>
+          <p:cNvSpPr txBox="1"/>
+          <p:nvPr/>
+        </p:nvSpPr>
+        <p:spPr>
+          <a:xfrm>
+            <a:off x="1202977" y="1624963"/>
+            <a:ext cx="986360" cy="369332"/>
+          </a:xfrm>
+          <a:prstGeom prst="rect">
+            <a:avLst/>
+          </a:prstGeom>
+          <a:noFill/>
+        </p:spPr>
+        <p:txBody>
+          <a:bodyPr wrap="none" rtlCol="0">
+            <a:spAutoFit/>
+          </a:bodyPr>
+          <a:lstStyle/>
+          <a:p>
+            <a:r>
+              <a:rPr lang="en-US" altLang="zh-TW" dirty="0"/>
+              <a:t>(Predict)</a:t>
+            </a:r>
+            <a:endParaRPr lang="zh-TW" altLang="en-US" dirty="0"/>
+          </a:p>
+        </p:txBody>
+      </p:sp>
+      <p:sp>
+        <p:nvSpPr>
+          <p:cNvPr id="45" name="文字方塊 44">
+            <a:extLst>
+              <a:ext uri="{FF2B5EF4-FFF2-40B4-BE49-F238E27FC236}">
+                <a16:creationId xmlns:a16="http://schemas.microsoft.com/office/drawing/2014/main" id="{AC3F0889-ACE9-42FF-A6F1-D11524473F3D}"/>
+              </a:ext>
+            </a:extLst>
+          </p:cNvPr>
+          <p:cNvSpPr txBox="1"/>
+          <p:nvPr/>
+        </p:nvSpPr>
+        <p:spPr>
+          <a:xfrm>
+            <a:off x="2057380" y="3964414"/>
+            <a:ext cx="1146468" cy="369332"/>
+          </a:xfrm>
+          <a:prstGeom prst="rect">
+            <a:avLst/>
+          </a:prstGeom>
+          <a:noFill/>
+        </p:spPr>
+        <p:txBody>
+          <a:bodyPr wrap="none" rtlCol="0">
+            <a:spAutoFit/>
+          </a:bodyPr>
+          <a:lstStyle/>
+          <a:p>
+            <a:r>
+              <a:rPr lang="en-US" altLang="zh-TW" dirty="0"/>
+              <a:t>(Blending)</a:t>
+            </a:r>
+            <a:endParaRPr lang="zh-TW" altLang="en-US" dirty="0"/>
+          </a:p>
+        </p:txBody>
+      </p:sp>
     </p:spTree>
     <p:extLst>
       <p:ext uri="{BB962C8B-B14F-4D97-AF65-F5344CB8AC3E}">
@@ -6144,7 +5859,7 @@
         </p:nvSpPr>
         <p:spPr>
           <a:xfrm>
-            <a:off x="-572994" y="2060849"/>
+            <a:off x="-3132856" y="2060849"/>
             <a:ext cx="1512168" cy="1008112"/>
           </a:xfrm>
           <a:prstGeom prst="flowChartMagneticDisk">
@@ -6171,7 +5886,7 @@
           <a:p>
             <a:pPr algn="ctr"/>
             <a:r>
-              <a:rPr lang="en-US" altLang="zh-TW" sz="2400" dirty="0" smtClean="0"/>
+              <a:rPr lang="en-US" altLang="zh-TW" sz="2400" dirty="0"/>
               <a:t>Train Data</a:t>
             </a:r>
             <a:endParaRPr lang="zh-TW" altLang="en-US" sz="2400" dirty="0"/>
@@ -6186,7 +5901,7 @@
         </p:nvSpPr>
         <p:spPr>
           <a:xfrm>
-            <a:off x="1259245" y="116632"/>
+            <a:off x="-1300617" y="116632"/>
             <a:ext cx="2640511" cy="720080"/>
           </a:xfrm>
           <a:prstGeom prst="flowChartProcess">
@@ -6213,55 +5928,17 @@
           <a:p>
             <a:pPr algn="ctr"/>
             <a:r>
-              <a:rPr lang="en-US" altLang="zh-TW" sz="2400" dirty="0" smtClean="0"/>
+              <a:rPr lang="en-US" altLang="zh-TW" sz="2400" dirty="0"/>
               <a:t>Model 1</a:t>
             </a:r>
           </a:p>
           <a:p>
             <a:pPr algn="ctr"/>
             <a:r>
-              <a:rPr lang="en-US" altLang="zh-TW" sz="2400" dirty="0" smtClean="0"/>
+              <a:rPr lang="en-US" altLang="zh-TW" sz="2400" dirty="0"/>
               <a:t>(Linear Regression)</a:t>
             </a:r>
             <a:endParaRPr lang="zh-TW" altLang="en-US" sz="2400" dirty="0"/>
-          </a:p>
-        </p:txBody>
-      </p:sp>
-      <p:sp>
-        <p:nvSpPr>
-          <p:cNvPr id="13" name="等腰三角形 12"/>
-          <p:cNvSpPr/>
-          <p:nvPr/>
-        </p:nvSpPr>
-        <p:spPr>
-          <a:xfrm rot="5400000">
-            <a:off x="13408002" y="3016045"/>
-            <a:ext cx="3528392" cy="576063"/>
-          </a:xfrm>
-          <a:prstGeom prst="triangle">
-            <a:avLst/>
-          </a:prstGeom>
-        </p:spPr>
-        <p:style>
-          <a:lnRef idx="2">
-            <a:schemeClr val="accent6"/>
-          </a:lnRef>
-          <a:fillRef idx="1">
-            <a:schemeClr val="lt1"/>
-          </a:fillRef>
-          <a:effectRef idx="0">
-            <a:schemeClr val="accent6"/>
-          </a:effectRef>
-          <a:fontRef idx="minor">
-            <a:schemeClr val="dk1"/>
-          </a:fontRef>
-        </p:style>
-        <p:txBody>
-          <a:bodyPr rtlCol="0" anchor="ctr"/>
-          <a:lstStyle/>
-          <a:p>
-            <a:pPr algn="ctr"/>
-            <a:endParaRPr lang="zh-TW" altLang="en-US" dirty="0"/>
           </a:p>
         </p:txBody>
       </p:sp>
@@ -6273,7 +5950,7 @@
         </p:nvSpPr>
         <p:spPr>
           <a:xfrm>
-            <a:off x="14035092" y="835224"/>
+            <a:off x="13953252" y="476672"/>
             <a:ext cx="2274212" cy="584775"/>
           </a:xfrm>
           <a:prstGeom prst="rect">
@@ -6288,7 +5965,7 @@
           <a:lstStyle/>
           <a:p>
             <a:r>
-              <a:rPr lang="en-US" altLang="zh-TW" sz="3200" dirty="0" smtClean="0">
+              <a:rPr lang="en-US" altLang="zh-TW" sz="3200" dirty="0">
                 <a:solidFill>
                   <a:schemeClr val="accent6"/>
                 </a:solidFill>
@@ -6311,7 +5988,7 @@
         </p:nvSpPr>
         <p:spPr>
           <a:xfrm>
-            <a:off x="1818416" y="1166867"/>
+            <a:off x="-741446" y="1166867"/>
             <a:ext cx="1313424" cy="821973"/>
           </a:xfrm>
           <a:prstGeom prst="flowChartMagneticDisk">
@@ -6338,7 +6015,7 @@
           <a:p>
             <a:pPr algn="ctr"/>
             <a:r>
-              <a:rPr lang="en-US" altLang="zh-TW" sz="2400" dirty="0" smtClean="0"/>
+              <a:rPr lang="en-US" altLang="zh-TW" sz="2400" dirty="0"/>
               <a:t>Subset-1</a:t>
             </a:r>
             <a:endParaRPr lang="zh-TW" altLang="en-US" sz="2400" dirty="0"/>
@@ -6353,7 +6030,7 @@
         </p:nvSpPr>
         <p:spPr>
           <a:xfrm>
-            <a:off x="1818416" y="2060849"/>
+            <a:off x="-741446" y="2060849"/>
             <a:ext cx="1313424" cy="821973"/>
           </a:xfrm>
           <a:prstGeom prst="flowChartMagneticDisk">
@@ -6380,7 +6057,7 @@
           <a:p>
             <a:pPr algn="ctr"/>
             <a:r>
-              <a:rPr lang="en-US" altLang="zh-TW" sz="2400" dirty="0" smtClean="0"/>
+              <a:rPr lang="en-US" altLang="zh-TW" sz="2400" dirty="0"/>
               <a:t>Subset-2</a:t>
             </a:r>
             <a:endParaRPr lang="zh-TW" altLang="en-US" sz="2400" dirty="0"/>
@@ -6395,7 +6072,7 @@
         </p:nvSpPr>
         <p:spPr>
           <a:xfrm>
-            <a:off x="1818416" y="2996952"/>
+            <a:off x="-741446" y="2996952"/>
             <a:ext cx="1313424" cy="821973"/>
           </a:xfrm>
           <a:prstGeom prst="flowChartMagneticDisk">
@@ -6422,7 +6099,7 @@
           <a:p>
             <a:pPr algn="ctr"/>
             <a:r>
-              <a:rPr lang="en-US" altLang="zh-TW" sz="2400" dirty="0" smtClean="0"/>
+              <a:rPr lang="en-US" altLang="zh-TW" sz="2400" dirty="0"/>
               <a:t>Subset-3</a:t>
             </a:r>
             <a:endParaRPr lang="zh-TW" altLang="en-US" sz="2400" dirty="0"/>
@@ -6437,7 +6114,7 @@
         </p:nvSpPr>
         <p:spPr>
           <a:xfrm>
-            <a:off x="4192807" y="116632"/>
+            <a:off x="1632945" y="116632"/>
             <a:ext cx="2640511" cy="720080"/>
           </a:xfrm>
           <a:prstGeom prst="flowChartProcess">
@@ -6464,14 +6141,14 @@
           <a:p>
             <a:pPr algn="ctr"/>
             <a:r>
-              <a:rPr lang="en-US" altLang="zh-TW" sz="2400" dirty="0" smtClean="0"/>
+              <a:rPr lang="en-US" altLang="zh-TW" sz="2400" dirty="0"/>
               <a:t>Model 1</a:t>
             </a:r>
           </a:p>
           <a:p>
             <a:pPr algn="ctr"/>
             <a:r>
-              <a:rPr lang="en-US" altLang="zh-TW" sz="2400" dirty="0" smtClean="0"/>
+              <a:rPr lang="en-US" altLang="zh-TW" sz="2400" dirty="0"/>
               <a:t>(Linear Regression)</a:t>
             </a:r>
             <a:endParaRPr lang="zh-TW" altLang="en-US" sz="2400" dirty="0"/>
@@ -6486,7 +6163,7 @@
         </p:nvSpPr>
         <p:spPr>
           <a:xfrm>
-            <a:off x="7118528" y="116632"/>
+            <a:off x="4558666" y="116632"/>
             <a:ext cx="2640511" cy="720080"/>
           </a:xfrm>
           <a:prstGeom prst="flowChartProcess">
@@ -6513,14 +6190,14 @@
           <a:p>
             <a:pPr algn="ctr"/>
             <a:r>
-              <a:rPr lang="en-US" altLang="zh-TW" sz="2400" dirty="0" smtClean="0"/>
+              <a:rPr lang="en-US" altLang="zh-TW" sz="2400" dirty="0"/>
               <a:t>Model 1</a:t>
             </a:r>
           </a:p>
           <a:p>
             <a:pPr algn="ctr"/>
             <a:r>
-              <a:rPr lang="en-US" altLang="zh-TW" sz="2400" dirty="0" smtClean="0"/>
+              <a:rPr lang="en-US" altLang="zh-TW" sz="2400" dirty="0"/>
               <a:t>(Linear Regression)</a:t>
             </a:r>
             <a:endParaRPr lang="zh-TW" altLang="en-US" sz="2400" dirty="0"/>
@@ -6535,7 +6212,7 @@
         </p:nvSpPr>
         <p:spPr>
           <a:xfrm>
-            <a:off x="4832844" y="1166866"/>
+            <a:off x="2272982" y="1166866"/>
             <a:ext cx="1313424" cy="821973"/>
           </a:xfrm>
           <a:prstGeom prst="flowChartMagneticDisk">
@@ -6562,7 +6239,7 @@
           <a:p>
             <a:pPr algn="ctr"/>
             <a:r>
-              <a:rPr lang="en-US" altLang="zh-TW" sz="2400" dirty="0" smtClean="0"/>
+              <a:rPr lang="en-US" altLang="zh-TW" sz="2400" dirty="0"/>
               <a:t>Subset-1</a:t>
             </a:r>
             <a:endParaRPr lang="zh-TW" altLang="en-US" sz="2400" dirty="0"/>
@@ -6577,7 +6254,7 @@
         </p:nvSpPr>
         <p:spPr>
           <a:xfrm>
-            <a:off x="4832844" y="2060848"/>
+            <a:off x="2272982" y="2060848"/>
             <a:ext cx="1313424" cy="821973"/>
           </a:xfrm>
           <a:prstGeom prst="flowChartMagneticDisk">
@@ -6604,7 +6281,7 @@
           <a:p>
             <a:pPr algn="ctr"/>
             <a:r>
-              <a:rPr lang="en-US" altLang="zh-TW" sz="2400" dirty="0" smtClean="0"/>
+              <a:rPr lang="en-US" altLang="zh-TW" sz="2400" dirty="0"/>
               <a:t>Subset-2</a:t>
             </a:r>
             <a:endParaRPr lang="zh-TW" altLang="en-US" sz="2400" dirty="0"/>
@@ -6619,7 +6296,7 @@
         </p:nvSpPr>
         <p:spPr>
           <a:xfrm>
-            <a:off x="4832844" y="2996951"/>
+            <a:off x="2272982" y="2996951"/>
             <a:ext cx="1313424" cy="821973"/>
           </a:xfrm>
           <a:prstGeom prst="flowChartMagneticDisk">
@@ -6646,7 +6323,7 @@
           <a:p>
             <a:pPr algn="ctr"/>
             <a:r>
-              <a:rPr lang="en-US" altLang="zh-TW" sz="2400" dirty="0" smtClean="0"/>
+              <a:rPr lang="en-US" altLang="zh-TW" sz="2400" dirty="0"/>
               <a:t>Subset-3</a:t>
             </a:r>
             <a:endParaRPr lang="zh-TW" altLang="en-US" sz="2400" dirty="0"/>
@@ -6661,7 +6338,7 @@
         </p:nvSpPr>
         <p:spPr>
           <a:xfrm>
-            <a:off x="7782071" y="1166867"/>
+            <a:off x="5222209" y="1166867"/>
             <a:ext cx="1313424" cy="821973"/>
           </a:xfrm>
           <a:prstGeom prst="flowChartMagneticDisk">
@@ -6688,7 +6365,7 @@
           <a:p>
             <a:pPr algn="ctr"/>
             <a:r>
-              <a:rPr lang="en-US" altLang="zh-TW" sz="2400" dirty="0" smtClean="0"/>
+              <a:rPr lang="en-US" altLang="zh-TW" sz="2400" dirty="0"/>
               <a:t>Subset-1</a:t>
             </a:r>
             <a:endParaRPr lang="zh-TW" altLang="en-US" sz="2400" dirty="0"/>
@@ -6703,7 +6380,7 @@
         </p:nvSpPr>
         <p:spPr>
           <a:xfrm>
-            <a:off x="7782071" y="2060849"/>
+            <a:off x="5222209" y="2060849"/>
             <a:ext cx="1313424" cy="821973"/>
           </a:xfrm>
           <a:prstGeom prst="flowChartMagneticDisk">
@@ -6730,7 +6407,7 @@
           <a:p>
             <a:pPr algn="ctr"/>
             <a:r>
-              <a:rPr lang="en-US" altLang="zh-TW" sz="2400" dirty="0" smtClean="0"/>
+              <a:rPr lang="en-US" altLang="zh-TW" sz="2400" dirty="0"/>
               <a:t>Subset-2</a:t>
             </a:r>
             <a:endParaRPr lang="zh-TW" altLang="en-US" sz="2400" dirty="0"/>
@@ -6745,7 +6422,7 @@
         </p:nvSpPr>
         <p:spPr>
           <a:xfrm>
-            <a:off x="7782071" y="2996952"/>
+            <a:off x="5222209" y="2996952"/>
             <a:ext cx="1313424" cy="821973"/>
           </a:xfrm>
           <a:prstGeom prst="flowChartMagneticDisk">
@@ -6772,7 +6449,7 @@
           <a:p>
             <a:pPr algn="ctr"/>
             <a:r>
-              <a:rPr lang="en-US" altLang="zh-TW" sz="2400" dirty="0" smtClean="0"/>
+              <a:rPr lang="en-US" altLang="zh-TW" sz="2400" dirty="0"/>
               <a:t>Subset-3</a:t>
             </a:r>
             <a:endParaRPr lang="zh-TW" altLang="en-US" sz="2400" dirty="0"/>
@@ -6787,7 +6464,7 @@
         </p:nvSpPr>
         <p:spPr>
           <a:xfrm>
-            <a:off x="-572994" y="4581128"/>
+            <a:off x="-3132856" y="4581128"/>
             <a:ext cx="1512168" cy="1008112"/>
           </a:xfrm>
           <a:prstGeom prst="flowChartMagneticDisk">
@@ -6814,7 +6491,7 @@
           <a:p>
             <a:pPr algn="ctr"/>
             <a:r>
-              <a:rPr lang="en-US" altLang="zh-TW" sz="2400" dirty="0" smtClean="0"/>
+              <a:rPr lang="en-US" altLang="zh-TW" sz="2400" dirty="0"/>
               <a:t>Test Data</a:t>
             </a:r>
             <a:endParaRPr lang="zh-TW" altLang="en-US" sz="2400" dirty="0"/>
@@ -6829,7 +6506,7 @@
         </p:nvSpPr>
         <p:spPr>
           <a:xfrm>
-            <a:off x="1611032" y="4619314"/>
+            <a:off x="-948830" y="4619314"/>
             <a:ext cx="1728192" cy="897918"/>
           </a:xfrm>
           <a:prstGeom prst="rect">
@@ -6856,7 +6533,7 @@
           <a:p>
             <a:pPr algn="ctr"/>
             <a:r>
-              <a:rPr lang="en-US" altLang="zh-TW" sz="2400" dirty="0" smtClean="0"/>
+              <a:rPr lang="en-US" altLang="zh-TW" sz="2400" dirty="0"/>
               <a:t>Predict</a:t>
             </a:r>
             <a:endParaRPr lang="zh-TW" altLang="en-US" sz="2400" dirty="0"/>
@@ -6871,7 +6548,7 @@
         </p:nvSpPr>
         <p:spPr>
           <a:xfrm>
-            <a:off x="4648966" y="4619314"/>
+            <a:off x="2089104" y="4619314"/>
             <a:ext cx="1728192" cy="897918"/>
           </a:xfrm>
           <a:prstGeom prst="rect">
@@ -6898,7 +6575,7 @@
           <a:p>
             <a:pPr algn="ctr"/>
             <a:r>
-              <a:rPr lang="en-US" altLang="zh-TW" sz="2400" dirty="0" smtClean="0"/>
+              <a:rPr lang="en-US" altLang="zh-TW" sz="2400" dirty="0"/>
               <a:t>Predict</a:t>
             </a:r>
             <a:endParaRPr lang="zh-TW" altLang="en-US" sz="2400" dirty="0"/>
@@ -6913,7 +6590,7 @@
         </p:nvSpPr>
         <p:spPr>
           <a:xfrm>
-            <a:off x="7564282" y="4636225"/>
+            <a:off x="5004420" y="4636225"/>
             <a:ext cx="1728192" cy="897918"/>
           </a:xfrm>
           <a:prstGeom prst="rect">
@@ -6940,7 +6617,7 @@
           <a:p>
             <a:pPr algn="ctr"/>
             <a:r>
-              <a:rPr lang="en-US" altLang="zh-TW" sz="2400" dirty="0" smtClean="0"/>
+              <a:rPr lang="en-US" altLang="zh-TW" sz="2400" dirty="0"/>
               <a:t>Predict</a:t>
             </a:r>
             <a:endParaRPr lang="zh-TW" altLang="en-US" sz="2400" dirty="0"/>
@@ -6955,7 +6632,7 @@
         </p:nvSpPr>
         <p:spPr>
           <a:xfrm>
-            <a:off x="10414610" y="2921007"/>
+            <a:off x="7867548" y="2921007"/>
             <a:ext cx="1728192" cy="897918"/>
           </a:xfrm>
           <a:prstGeom prst="rect">
@@ -6982,8 +6659,8 @@
           <a:p>
             <a:pPr algn="ctr"/>
             <a:r>
-              <a:rPr lang="en-US" altLang="zh-TW" sz="2400" dirty="0" err="1" smtClean="0"/>
-              <a:t>Predict_X</a:t>
+              <a:rPr lang="en-US" altLang="zh-TW" sz="2400" dirty="0"/>
+              <a:t>Predict_3</a:t>
             </a:r>
             <a:endParaRPr lang="zh-TW" altLang="en-US" sz="2400" dirty="0"/>
           </a:p>
@@ -6997,7 +6674,7 @@
         </p:nvSpPr>
         <p:spPr>
           <a:xfrm>
-            <a:off x="10427410" y="2022875"/>
+            <a:off x="7867548" y="2022875"/>
             <a:ext cx="1728192" cy="897918"/>
           </a:xfrm>
           <a:prstGeom prst="rect">
@@ -7024,8 +6701,8 @@
           <a:p>
             <a:pPr algn="ctr"/>
             <a:r>
-              <a:rPr lang="en-US" altLang="zh-TW" sz="2400" dirty="0" err="1" smtClean="0"/>
-              <a:t>Predict_X</a:t>
+              <a:rPr lang="en-US" altLang="zh-TW" sz="2400" dirty="0"/>
+              <a:t>Predict_2</a:t>
             </a:r>
             <a:endParaRPr lang="zh-TW" altLang="en-US" sz="2400" dirty="0"/>
           </a:p>
@@ -7039,7 +6716,7 @@
         </p:nvSpPr>
         <p:spPr>
           <a:xfrm>
-            <a:off x="10427410" y="1090921"/>
+            <a:off x="7867548" y="1090921"/>
             <a:ext cx="1728192" cy="897918"/>
           </a:xfrm>
           <a:prstGeom prst="rect">
@@ -7066,8 +6743,8 @@
           <a:p>
             <a:pPr algn="ctr"/>
             <a:r>
-              <a:rPr lang="en-US" altLang="zh-TW" sz="2400" dirty="0" err="1" smtClean="0"/>
-              <a:t>Predict_X</a:t>
+              <a:rPr lang="en-US" altLang="zh-TW" sz="2400" dirty="0"/>
+              <a:t>Predict_1</a:t>
             </a:r>
             <a:endParaRPr lang="zh-TW" altLang="en-US" sz="2400" dirty="0"/>
           </a:p>
@@ -7077,14 +6754,13 @@
         <p:nvCxnSpPr>
           <p:cNvPr id="80" name="直線單箭頭接點 79"/>
           <p:cNvCxnSpPr>
-            <a:stCxn id="45" idx="4"/>
-            <a:endCxn id="77" idx="1"/>
+            <a:cxnSpLocks/>
           </p:cNvCxnSpPr>
           <p:nvPr/>
         </p:nvCxnSpPr>
         <p:spPr>
           <a:xfrm flipV="1">
-            <a:off x="3131840" y="3369966"/>
+            <a:off x="571978" y="3657975"/>
             <a:ext cx="7282770" cy="37973"/>
           </a:xfrm>
           <a:prstGeom prst="straightConnector1">
@@ -7120,7 +6796,7 @@
         </p:nvCxnSpPr>
         <p:spPr>
           <a:xfrm flipV="1">
-            <a:off x="6146268" y="2471834"/>
+            <a:off x="3586406" y="2471834"/>
             <a:ext cx="4281142" cy="1"/>
           </a:xfrm>
           <a:prstGeom prst="straightConnector1">
@@ -7149,15 +6825,14 @@
         <p:nvCxnSpPr>
           <p:cNvPr id="82" name="直線單箭頭接點 81"/>
           <p:cNvCxnSpPr>
-            <a:stCxn id="71" idx="4"/>
-            <a:endCxn id="79" idx="1"/>
+            <a:cxnSpLocks/>
           </p:cNvCxnSpPr>
           <p:nvPr/>
         </p:nvCxnSpPr>
         <p:spPr>
-          <a:xfrm flipV="1">
-            <a:off x="9095495" y="1539880"/>
-            <a:ext cx="1331915" cy="37974"/>
+          <a:xfrm>
+            <a:off x="6535633" y="1323645"/>
+            <a:ext cx="1331915" cy="0"/>
           </a:xfrm>
           <a:prstGeom prst="straightConnector1">
             <a:avLst/>
@@ -7189,7 +6864,7 @@
         </p:nvCxnSpPr>
         <p:spPr>
           <a:xfrm>
-            <a:off x="9396536" y="5085184"/>
+            <a:off x="6836674" y="5085184"/>
             <a:ext cx="1018074" cy="1"/>
           </a:xfrm>
           <a:prstGeom prst="straightConnector1">
@@ -7222,7 +6897,7 @@
         </p:nvSpPr>
         <p:spPr>
           <a:xfrm>
-            <a:off x="10427410" y="4636225"/>
+            <a:off x="7867548" y="4636225"/>
             <a:ext cx="1728192" cy="897918"/>
           </a:xfrm>
           <a:prstGeom prst="rect">
@@ -7249,7 +6924,14 @@
           <a:p>
             <a:pPr algn="ctr"/>
             <a:r>
-              <a:rPr lang="en-US" altLang="zh-TW" sz="2400" dirty="0" err="1" smtClean="0"/>
+              <a:rPr lang="en-US" altLang="zh-TW" sz="2400" dirty="0"/>
+              <a:t>Avg.</a:t>
+            </a:r>
+          </a:p>
+          <a:p>
+            <a:pPr algn="ctr"/>
+            <a:r>
+              <a:rPr lang="en-US" altLang="zh-TW" sz="2400" dirty="0" err="1"/>
               <a:t>Predict_Y</a:t>
             </a:r>
             <a:endParaRPr lang="zh-TW" altLang="en-US" sz="2400" dirty="0"/>
@@ -7264,8 +6946,8 @@
         </p:nvSpPr>
         <p:spPr>
           <a:xfrm>
-            <a:off x="9438907" y="4581128"/>
-            <a:ext cx="939296" cy="369332"/>
+            <a:off x="6830300" y="4613066"/>
+            <a:ext cx="1024448" cy="400110"/>
           </a:xfrm>
           <a:prstGeom prst="rect">
             <a:avLst/>
@@ -7279,10 +6961,10 @@
           <a:lstStyle/>
           <a:p>
             <a:r>
-              <a:rPr lang="en-US" altLang="zh-TW" dirty="0" smtClean="0"/>
+              <a:rPr lang="en-US" altLang="zh-TW" sz="2000" dirty="0"/>
               <a:t>Average</a:t>
             </a:r>
-            <a:endParaRPr lang="zh-TW" altLang="en-US" dirty="0"/>
+            <a:endParaRPr lang="zh-TW" altLang="en-US" sz="2000" dirty="0"/>
           </a:p>
         </p:txBody>
       </p:sp>
@@ -7294,7 +6976,7 @@
         </p:nvSpPr>
         <p:spPr>
           <a:xfrm>
-            <a:off x="10182035" y="179929"/>
+            <a:off x="9896156" y="320376"/>
             <a:ext cx="2218941" cy="584775"/>
           </a:xfrm>
           <a:prstGeom prst="rect">
@@ -7309,7 +6991,7 @@
           <a:lstStyle/>
           <a:p>
             <a:r>
-              <a:rPr lang="en-US" altLang="zh-TW" sz="3200" dirty="0" smtClean="0">
+              <a:rPr lang="en-US" altLang="zh-TW" sz="3200" dirty="0">
                 <a:solidFill>
                   <a:srgbClr val="002060"/>
                 </a:solidFill>
@@ -7327,13 +7009,15 @@
       <p:cxnSp>
         <p:nvCxnSpPr>
           <p:cNvPr id="86" name="直線單箭頭接點 85"/>
-          <p:cNvCxnSpPr/>
+          <p:cNvCxnSpPr>
+            <a:cxnSpLocks/>
+          </p:cNvCxnSpPr>
           <p:nvPr/>
         </p:nvCxnSpPr>
         <p:spPr>
           <a:xfrm>
-            <a:off x="13538082" y="3304077"/>
-            <a:ext cx="944812" cy="0"/>
+            <a:off x="11844808" y="2471834"/>
+            <a:ext cx="1368152" cy="0"/>
           </a:xfrm>
           <a:prstGeom prst="straightConnector1">
             <a:avLst/>
@@ -7365,7 +7049,7 @@
         </p:nvSpPr>
         <p:spPr>
           <a:xfrm>
-            <a:off x="12400976" y="1127612"/>
+            <a:off x="10437074" y="1127612"/>
             <a:ext cx="1137106" cy="2691314"/>
           </a:xfrm>
           <a:prstGeom prst="rect">
@@ -7373,71 +7057,325 @@
           </a:prstGeom>
         </p:spPr>
         <p:style>
-          <a:lnRef idx="2">
-            <a:schemeClr val="accent6"/>
-          </a:lnRef>
-          <a:fillRef idx="1">
+          <a:lnRef idx="1">
+            <a:schemeClr val="accent2"/>
+          </a:lnRef>
+          <a:fillRef idx="2">
+            <a:schemeClr val="accent2"/>
+          </a:fillRef>
+          <a:effectRef idx="1">
+            <a:schemeClr val="accent2"/>
+          </a:effectRef>
+          <a:fontRef idx="minor">
+            <a:schemeClr val="dk1"/>
+          </a:fontRef>
+        </p:style>
+        <p:txBody>
+          <a:bodyPr rtlCol="0" anchor="ctr"/>
+          <a:lstStyle/>
+          <a:p>
+            <a:pPr algn="ctr"/>
+            <a:r>
+              <a:rPr lang="en-US" altLang="zh-TW" sz="2400" dirty="0"/>
+              <a:t>Meta-X</a:t>
+            </a:r>
+            <a:endParaRPr lang="zh-TW" altLang="en-US" sz="2400" dirty="0"/>
+          </a:p>
+        </p:txBody>
+      </p:sp>
+      <p:sp>
+        <p:nvSpPr>
+          <p:cNvPr id="3" name="文字方塊 2">
+            <a:extLst>
+              <a:ext uri="{FF2B5EF4-FFF2-40B4-BE49-F238E27FC236}">
+                <a16:creationId xmlns:a16="http://schemas.microsoft.com/office/drawing/2014/main" id="{F5CFB7E2-37FE-49A2-A791-3F1FE568DF8E}"/>
+              </a:ext>
+            </a:extLst>
+          </p:cNvPr>
+          <p:cNvSpPr txBox="1"/>
+          <p:nvPr/>
+        </p:nvSpPr>
+        <p:spPr>
+          <a:xfrm>
+            <a:off x="9772880" y="2151352"/>
+            <a:ext cx="465192" cy="769441"/>
+          </a:xfrm>
+          <a:prstGeom prst="rect">
+            <a:avLst/>
+          </a:prstGeom>
+          <a:noFill/>
+        </p:spPr>
+        <p:txBody>
+          <a:bodyPr wrap="none" rtlCol="0">
+            <a:spAutoFit/>
+          </a:bodyPr>
+          <a:lstStyle/>
+          <a:p>
+            <a:r>
+              <a:rPr lang="en-US" altLang="zh-TW" sz="4400" dirty="0"/>
+              <a:t>=</a:t>
+            </a:r>
+            <a:endParaRPr lang="zh-TW" altLang="en-US" sz="4400" dirty="0"/>
+          </a:p>
+        </p:txBody>
+      </p:sp>
+      <p:sp>
+        <p:nvSpPr>
+          <p:cNvPr id="36" name="文字方塊 35">
+            <a:extLst>
+              <a:ext uri="{FF2B5EF4-FFF2-40B4-BE49-F238E27FC236}">
+                <a16:creationId xmlns:a16="http://schemas.microsoft.com/office/drawing/2014/main" id="{04DDFDE7-FABA-4D0D-8260-3404527BC39A}"/>
+              </a:ext>
+            </a:extLst>
+          </p:cNvPr>
+          <p:cNvSpPr txBox="1"/>
+          <p:nvPr/>
+        </p:nvSpPr>
+        <p:spPr>
+          <a:xfrm>
+            <a:off x="9777995" y="4683552"/>
+            <a:ext cx="465192" cy="769441"/>
+          </a:xfrm>
+          <a:prstGeom prst="rect">
+            <a:avLst/>
+          </a:prstGeom>
+          <a:noFill/>
+        </p:spPr>
+        <p:txBody>
+          <a:bodyPr wrap="none" rtlCol="0">
+            <a:spAutoFit/>
+          </a:bodyPr>
+          <a:lstStyle/>
+          <a:p>
+            <a:r>
+              <a:rPr lang="en-US" altLang="zh-TW" sz="4400" dirty="0"/>
+              <a:t>=</a:t>
+            </a:r>
+            <a:endParaRPr lang="zh-TW" altLang="en-US" sz="4400" dirty="0"/>
+          </a:p>
+        </p:txBody>
+      </p:sp>
+      <p:sp>
+        <p:nvSpPr>
+          <p:cNvPr id="38" name="矩形 37">
+            <a:extLst>
+              <a:ext uri="{FF2B5EF4-FFF2-40B4-BE49-F238E27FC236}">
+                <a16:creationId xmlns:a16="http://schemas.microsoft.com/office/drawing/2014/main" id="{43752BFE-3335-400C-82E9-8302D2966C59}"/>
+              </a:ext>
+            </a:extLst>
+          </p:cNvPr>
+          <p:cNvSpPr/>
+          <p:nvPr/>
+        </p:nvSpPr>
+        <p:spPr>
+          <a:xfrm>
+            <a:off x="10437074" y="4683552"/>
+            <a:ext cx="1137106" cy="905688"/>
+          </a:xfrm>
+          <a:prstGeom prst="rect">
+            <a:avLst/>
+          </a:prstGeom>
+        </p:spPr>
+        <p:style>
+          <a:lnRef idx="1">
+            <a:schemeClr val="accent4"/>
+          </a:lnRef>
+          <a:fillRef idx="2">
+            <a:schemeClr val="accent4"/>
+          </a:fillRef>
+          <a:effectRef idx="1">
+            <a:schemeClr val="accent4"/>
+          </a:effectRef>
+          <a:fontRef idx="minor">
+            <a:schemeClr val="dk1"/>
+          </a:fontRef>
+        </p:style>
+        <p:txBody>
+          <a:bodyPr rtlCol="0" anchor="ctr"/>
+          <a:lstStyle/>
+          <a:p>
+            <a:pPr algn="ctr"/>
+            <a:r>
+              <a:rPr lang="en-US" altLang="zh-TW" sz="2400" dirty="0"/>
+              <a:t>Meta-Y</a:t>
+            </a:r>
+            <a:endParaRPr lang="zh-TW" altLang="en-US" sz="2400" dirty="0"/>
+          </a:p>
+        </p:txBody>
+      </p:sp>
+      <p:sp>
+        <p:nvSpPr>
+          <p:cNvPr id="40" name="流程圖: 程序 39">
+            <a:extLst>
+              <a:ext uri="{FF2B5EF4-FFF2-40B4-BE49-F238E27FC236}">
+                <a16:creationId xmlns:a16="http://schemas.microsoft.com/office/drawing/2014/main" id="{4B8125A9-C3EB-4E94-ACBD-A65F400C01FD}"/>
+              </a:ext>
+            </a:extLst>
+          </p:cNvPr>
+          <p:cNvSpPr/>
+          <p:nvPr/>
+        </p:nvSpPr>
+        <p:spPr>
+          <a:xfrm>
+            <a:off x="13497181" y="1540467"/>
+            <a:ext cx="3186354" cy="1830085"/>
+          </a:xfrm>
+          <a:prstGeom prst="flowChartProcess">
+            <a:avLst/>
+          </a:prstGeom>
+          <a:solidFill>
+            <a:schemeClr val="accent6">
+              <a:alpha val="50000"/>
+            </a:schemeClr>
+          </a:solidFill>
+          <a:ln>
+            <a:noFill/>
+          </a:ln>
+        </p:spPr>
+        <p:style>
+          <a:lnRef idx="0">
+            <a:scrgbClr r="0" g="0" b="0"/>
+          </a:lnRef>
+          <a:fillRef idx="0">
+            <a:scrgbClr r="0" g="0" b="0"/>
+          </a:fillRef>
+          <a:effectRef idx="0">
+            <a:scrgbClr r="0" g="0" b="0"/>
+          </a:effectRef>
+          <a:fontRef idx="minor">
             <a:schemeClr val="lt1"/>
+          </a:fontRef>
+        </p:style>
+        <p:txBody>
+          <a:bodyPr rtlCol="0" anchor="ctr"/>
+          <a:lstStyle/>
+          <a:p>
+            <a:pPr algn="ctr"/>
+            <a:r>
+              <a:rPr lang="en-US" altLang="zh-TW" sz="2400" dirty="0"/>
+              <a:t>Meta-Model</a:t>
+            </a:r>
+          </a:p>
+          <a:p>
+            <a:pPr algn="ctr"/>
+            <a:r>
+              <a:rPr lang="en-US" altLang="zh-TW" sz="2400" dirty="0"/>
+              <a:t>(Blender / meta learner)</a:t>
+            </a:r>
+            <a:endParaRPr lang="zh-TW" altLang="en-US" sz="2400" dirty="0"/>
+          </a:p>
+        </p:txBody>
+      </p:sp>
+      <p:sp>
+        <p:nvSpPr>
+          <p:cNvPr id="42" name="文字方塊 41">
+            <a:extLst>
+              <a:ext uri="{FF2B5EF4-FFF2-40B4-BE49-F238E27FC236}">
+                <a16:creationId xmlns:a16="http://schemas.microsoft.com/office/drawing/2014/main" id="{3212FE9C-94F0-4C00-8432-4926CCA02EB1}"/>
+              </a:ext>
+            </a:extLst>
+          </p:cNvPr>
+          <p:cNvSpPr txBox="1"/>
+          <p:nvPr/>
+        </p:nvSpPr>
+        <p:spPr>
+          <a:xfrm>
+            <a:off x="11782205" y="1858964"/>
+            <a:ext cx="1506951" cy="584775"/>
+          </a:xfrm>
+          <a:prstGeom prst="rect">
+            <a:avLst/>
+          </a:prstGeom>
+          <a:noFill/>
+        </p:spPr>
+        <p:txBody>
+          <a:bodyPr wrap="none" rtlCol="0">
+            <a:spAutoFit/>
+          </a:bodyPr>
+          <a:lstStyle/>
+          <a:p>
+            <a:r>
+              <a:rPr lang="en-US" altLang="zh-TW" sz="3200" dirty="0"/>
+              <a:t>Training</a:t>
+            </a:r>
+            <a:endParaRPr lang="zh-TW" altLang="en-US" sz="3200" dirty="0"/>
+          </a:p>
+        </p:txBody>
+      </p:sp>
+      <p:cxnSp>
+        <p:nvCxnSpPr>
+          <p:cNvPr id="43" name="直線單箭頭接點 42">
+            <a:extLst>
+              <a:ext uri="{FF2B5EF4-FFF2-40B4-BE49-F238E27FC236}">
+                <a16:creationId xmlns:a16="http://schemas.microsoft.com/office/drawing/2014/main" id="{5D265AB5-F129-4222-A61B-5493442C59AE}"/>
+              </a:ext>
+            </a:extLst>
+          </p:cNvPr>
+          <p:cNvCxnSpPr>
+            <a:cxnSpLocks/>
+          </p:cNvCxnSpPr>
+          <p:nvPr/>
+        </p:nvCxnSpPr>
+        <p:spPr>
+          <a:xfrm flipV="1">
+            <a:off x="11700792" y="3676961"/>
+            <a:ext cx="3389566" cy="1552239"/>
+          </a:xfrm>
+          <a:prstGeom prst="straightConnector1">
+            <a:avLst/>
+          </a:prstGeom>
+          <a:ln w="28575">
+            <a:tailEnd type="arrow"/>
+          </a:ln>
+        </p:spPr>
+        <p:style>
+          <a:lnRef idx="1">
+            <a:schemeClr val="dk1"/>
+          </a:lnRef>
+          <a:fillRef idx="0">
+            <a:schemeClr val="dk1"/>
           </a:fillRef>
           <a:effectRef idx="0">
-            <a:schemeClr val="accent6"/>
-          </a:effectRef>
-          <a:fontRef idx="minor">
-            <a:schemeClr val="dk1"/>
-          </a:fontRef>
-        </p:style>
-        <p:txBody>
-          <a:bodyPr rtlCol="0" anchor="ctr"/>
-          <a:lstStyle/>
-          <a:p>
-            <a:pPr algn="ctr"/>
-            <a:r>
-              <a:rPr lang="en-US" altLang="zh-TW" dirty="0" smtClean="0"/>
-              <a:t>Meta-X</a:t>
-            </a:r>
-            <a:endParaRPr lang="zh-TW" altLang="en-US" dirty="0"/>
-          </a:p>
-        </p:txBody>
-      </p:sp>
-      <p:sp>
-        <p:nvSpPr>
-          <p:cNvPr id="89" name="矩形 88"/>
-          <p:cNvSpPr/>
-          <p:nvPr/>
-        </p:nvSpPr>
-        <p:spPr>
-          <a:xfrm>
-            <a:off x="12400976" y="3818926"/>
-            <a:ext cx="1137106" cy="1698307"/>
+            <a:schemeClr val="dk1"/>
+          </a:effectRef>
+          <a:fontRef idx="minor">
+            <a:schemeClr val="tx1"/>
+          </a:fontRef>
+        </p:style>
+      </p:cxnSp>
+      <p:sp>
+        <p:nvSpPr>
+          <p:cNvPr id="46" name="文字方塊 45">
+            <a:extLst>
+              <a:ext uri="{FF2B5EF4-FFF2-40B4-BE49-F238E27FC236}">
+                <a16:creationId xmlns:a16="http://schemas.microsoft.com/office/drawing/2014/main" id="{7F849DAC-C23B-45E2-8436-D0319A2EB407}"/>
+              </a:ext>
+            </a:extLst>
+          </p:cNvPr>
+          <p:cNvSpPr txBox="1"/>
+          <p:nvPr/>
+        </p:nvSpPr>
+        <p:spPr>
+          <a:xfrm>
+            <a:off x="13194173" y="4613066"/>
+            <a:ext cx="1359090" cy="584775"/>
           </a:xfrm>
           <a:prstGeom prst="rect">
             <a:avLst/>
           </a:prstGeom>
-        </p:spPr>
-        <p:style>
-          <a:lnRef idx="2">
-            <a:schemeClr val="accent6"/>
-          </a:lnRef>
-          <a:fillRef idx="1">
-            <a:schemeClr val="lt1"/>
-          </a:fillRef>
-          <a:effectRef idx="0">
-            <a:schemeClr val="accent6"/>
-          </a:effectRef>
-          <a:fontRef idx="minor">
-            <a:schemeClr val="dk1"/>
-          </a:fontRef>
-        </p:style>
-        <p:txBody>
-          <a:bodyPr rtlCol="0" anchor="ctr"/>
-          <a:lstStyle/>
-          <a:p>
-            <a:pPr algn="ctr"/>
-            <a:r>
-              <a:rPr lang="en-US" altLang="zh-TW" dirty="0" smtClean="0"/>
-              <a:t>Meta-Y</a:t>
-            </a:r>
-            <a:endParaRPr lang="zh-TW" altLang="en-US" dirty="0"/>
+          <a:noFill/>
+        </p:spPr>
+        <p:txBody>
+          <a:bodyPr wrap="none" rtlCol="0">
+            <a:spAutoFit/>
+          </a:bodyPr>
+          <a:lstStyle/>
+          <a:p>
+            <a:r>
+              <a:rPr lang="en-US" altLang="zh-TW" sz="3200" dirty="0"/>
+              <a:t>Predict</a:t>
+            </a:r>
+            <a:endParaRPr lang="zh-TW" altLang="en-US" sz="3200" dirty="0"/>
           </a:p>
         </p:txBody>
       </p:sp>
@@ -7471,6 +7409,1419 @@
           <a:chExt cx="0" cy="0"/>
         </a:xfrm>
       </p:grpSpPr>
+      <p:cxnSp>
+        <p:nvCxnSpPr>
+          <p:cNvPr id="12" name="直線單箭頭接點 11"/>
+          <p:cNvCxnSpPr>
+            <a:cxnSpLocks/>
+          </p:cNvCxnSpPr>
+          <p:nvPr/>
+        </p:nvCxnSpPr>
+        <p:spPr>
+          <a:xfrm flipH="1">
+            <a:off x="3059832" y="764704"/>
+            <a:ext cx="1080120" cy="648072"/>
+          </a:xfrm>
+          <a:prstGeom prst="straightConnector1">
+            <a:avLst/>
+          </a:prstGeom>
+          <a:ln w="28575">
+            <a:tailEnd type="arrow"/>
+          </a:ln>
+        </p:spPr>
+        <p:style>
+          <a:lnRef idx="1">
+            <a:schemeClr val="dk1"/>
+          </a:lnRef>
+          <a:fillRef idx="0">
+            <a:schemeClr val="dk1"/>
+          </a:fillRef>
+          <a:effectRef idx="0">
+            <a:schemeClr val="dk1"/>
+          </a:effectRef>
+          <a:fontRef idx="minor">
+            <a:schemeClr val="tx1"/>
+          </a:fontRef>
+        </p:style>
+      </p:cxnSp>
+      <p:cxnSp>
+        <p:nvCxnSpPr>
+          <p:cNvPr id="15" name="直線單箭頭接點 14"/>
+          <p:cNvCxnSpPr>
+            <a:cxnSpLocks/>
+          </p:cNvCxnSpPr>
+          <p:nvPr/>
+        </p:nvCxnSpPr>
+        <p:spPr>
+          <a:xfrm>
+            <a:off x="4806026" y="764704"/>
+            <a:ext cx="0" cy="648072"/>
+          </a:xfrm>
+          <a:prstGeom prst="straightConnector1">
+            <a:avLst/>
+          </a:prstGeom>
+          <a:ln w="28575">
+            <a:tailEnd type="arrow"/>
+          </a:ln>
+        </p:spPr>
+        <p:style>
+          <a:lnRef idx="1">
+            <a:schemeClr val="dk1"/>
+          </a:lnRef>
+          <a:fillRef idx="0">
+            <a:schemeClr val="dk1"/>
+          </a:fillRef>
+          <a:effectRef idx="0">
+            <a:schemeClr val="dk1"/>
+          </a:effectRef>
+          <a:fontRef idx="minor">
+            <a:schemeClr val="tx1"/>
+          </a:fontRef>
+        </p:style>
+      </p:cxnSp>
+      <p:cxnSp>
+        <p:nvCxnSpPr>
+          <p:cNvPr id="18" name="直線單箭頭接點 17"/>
+          <p:cNvCxnSpPr>
+            <a:cxnSpLocks/>
+          </p:cNvCxnSpPr>
+          <p:nvPr/>
+        </p:nvCxnSpPr>
+        <p:spPr>
+          <a:xfrm>
+            <a:off x="5580112" y="764704"/>
+            <a:ext cx="959889" cy="576064"/>
+          </a:xfrm>
+          <a:prstGeom prst="straightConnector1">
+            <a:avLst/>
+          </a:prstGeom>
+          <a:ln w="28575">
+            <a:tailEnd type="arrow"/>
+          </a:ln>
+        </p:spPr>
+        <p:style>
+          <a:lnRef idx="1">
+            <a:schemeClr val="dk1"/>
+          </a:lnRef>
+          <a:fillRef idx="0">
+            <a:schemeClr val="dk1"/>
+          </a:fillRef>
+          <a:effectRef idx="0">
+            <a:schemeClr val="dk1"/>
+          </a:effectRef>
+          <a:fontRef idx="minor">
+            <a:schemeClr val="tx1"/>
+          </a:fontRef>
+        </p:style>
+      </p:cxnSp>
+      <p:sp>
+        <p:nvSpPr>
+          <p:cNvPr id="24" name="流程圖: 程序 23"/>
+          <p:cNvSpPr/>
+          <p:nvPr/>
+        </p:nvSpPr>
+        <p:spPr>
+          <a:xfrm>
+            <a:off x="2339752" y="1449589"/>
+            <a:ext cx="1368152" cy="720080"/>
+          </a:xfrm>
+          <a:prstGeom prst="flowChartProcess">
+            <a:avLst/>
+          </a:prstGeom>
+        </p:spPr>
+        <p:style>
+          <a:lnRef idx="1">
+            <a:schemeClr val="accent1"/>
+          </a:lnRef>
+          <a:fillRef idx="2">
+            <a:schemeClr val="accent1"/>
+          </a:fillRef>
+          <a:effectRef idx="1">
+            <a:schemeClr val="accent1"/>
+          </a:effectRef>
+          <a:fontRef idx="minor">
+            <a:schemeClr val="dk1"/>
+          </a:fontRef>
+        </p:style>
+        <p:txBody>
+          <a:bodyPr rtlCol="0" anchor="ctr"/>
+          <a:lstStyle/>
+          <a:p>
+            <a:pPr algn="ctr"/>
+            <a:r>
+              <a:rPr lang="en-US" altLang="zh-TW" sz="2400" dirty="0"/>
+              <a:t>Model 1</a:t>
+            </a:r>
+          </a:p>
+          <a:p>
+            <a:pPr algn="ctr"/>
+            <a:r>
+              <a:rPr lang="en-US" altLang="zh-TW" sz="1200" dirty="0"/>
+              <a:t>(linear regression)</a:t>
+            </a:r>
+            <a:endParaRPr lang="zh-TW" altLang="en-US" sz="1200" dirty="0"/>
+          </a:p>
+        </p:txBody>
+      </p:sp>
+      <p:sp>
+        <p:nvSpPr>
+          <p:cNvPr id="29" name="流程圖: 程序 28"/>
+          <p:cNvSpPr/>
+          <p:nvPr/>
+        </p:nvSpPr>
+        <p:spPr>
+          <a:xfrm>
+            <a:off x="4139952" y="1449589"/>
+            <a:ext cx="1368152" cy="720080"/>
+          </a:xfrm>
+          <a:prstGeom prst="flowChartProcess">
+            <a:avLst/>
+          </a:prstGeom>
+        </p:spPr>
+        <p:style>
+          <a:lnRef idx="1">
+            <a:schemeClr val="accent2"/>
+          </a:lnRef>
+          <a:fillRef idx="2">
+            <a:schemeClr val="accent2"/>
+          </a:fillRef>
+          <a:effectRef idx="1">
+            <a:schemeClr val="accent2"/>
+          </a:effectRef>
+          <a:fontRef idx="minor">
+            <a:schemeClr val="dk1"/>
+          </a:fontRef>
+        </p:style>
+        <p:txBody>
+          <a:bodyPr rtlCol="0" anchor="ctr"/>
+          <a:lstStyle/>
+          <a:p>
+            <a:pPr algn="ctr"/>
+            <a:r>
+              <a:rPr lang="en-US" altLang="zh-TW" sz="2400" dirty="0"/>
+              <a:t>Model 2</a:t>
+            </a:r>
+          </a:p>
+          <a:p>
+            <a:pPr algn="ctr"/>
+            <a:r>
+              <a:rPr lang="en-US" altLang="zh-TW" sz="1200" dirty="0"/>
+              <a:t>(SVR)</a:t>
+            </a:r>
+            <a:endParaRPr lang="zh-TW" altLang="en-US" sz="1200" dirty="0"/>
+          </a:p>
+        </p:txBody>
+      </p:sp>
+      <p:sp>
+        <p:nvSpPr>
+          <p:cNvPr id="34" name="流程圖: 程序 33"/>
+          <p:cNvSpPr/>
+          <p:nvPr/>
+        </p:nvSpPr>
+        <p:spPr>
+          <a:xfrm>
+            <a:off x="5868144" y="1449589"/>
+            <a:ext cx="1368152" cy="720080"/>
+          </a:xfrm>
+          <a:prstGeom prst="flowChartProcess">
+            <a:avLst/>
+          </a:prstGeom>
+        </p:spPr>
+        <p:style>
+          <a:lnRef idx="1">
+            <a:schemeClr val="accent3"/>
+          </a:lnRef>
+          <a:fillRef idx="2">
+            <a:schemeClr val="accent3"/>
+          </a:fillRef>
+          <a:effectRef idx="1">
+            <a:schemeClr val="accent3"/>
+          </a:effectRef>
+          <a:fontRef idx="minor">
+            <a:schemeClr val="dk1"/>
+          </a:fontRef>
+        </p:style>
+        <p:txBody>
+          <a:bodyPr rtlCol="0" anchor="ctr"/>
+          <a:lstStyle/>
+          <a:p>
+            <a:pPr algn="ctr"/>
+            <a:r>
+              <a:rPr lang="en-US" altLang="zh-TW" sz="2400" dirty="0"/>
+              <a:t>Model 3</a:t>
+            </a:r>
+          </a:p>
+          <a:p>
+            <a:pPr algn="ctr"/>
+            <a:r>
+              <a:rPr lang="en-US" altLang="zh-TW" sz="1200" dirty="0"/>
+              <a:t>(CART)</a:t>
+            </a:r>
+            <a:endParaRPr lang="zh-TW" altLang="en-US" sz="1200" dirty="0"/>
+          </a:p>
+        </p:txBody>
+      </p:sp>
+      <p:cxnSp>
+        <p:nvCxnSpPr>
+          <p:cNvPr id="36" name="直線單箭頭接點 35"/>
+          <p:cNvCxnSpPr>
+            <a:cxnSpLocks/>
+          </p:cNvCxnSpPr>
+          <p:nvPr/>
+        </p:nvCxnSpPr>
+        <p:spPr>
+          <a:xfrm>
+            <a:off x="3050307" y="2267580"/>
+            <a:ext cx="0" cy="369332"/>
+          </a:xfrm>
+          <a:prstGeom prst="straightConnector1">
+            <a:avLst/>
+          </a:prstGeom>
+          <a:ln w="28575">
+            <a:tailEnd type="arrow"/>
+          </a:ln>
+        </p:spPr>
+        <p:style>
+          <a:lnRef idx="1">
+            <a:schemeClr val="dk1"/>
+          </a:lnRef>
+          <a:fillRef idx="0">
+            <a:schemeClr val="dk1"/>
+          </a:fillRef>
+          <a:effectRef idx="0">
+            <a:schemeClr val="dk1"/>
+          </a:effectRef>
+          <a:fontRef idx="minor">
+            <a:schemeClr val="tx1"/>
+          </a:fontRef>
+        </p:style>
+      </p:cxnSp>
+      <p:cxnSp>
+        <p:nvCxnSpPr>
+          <p:cNvPr id="46" name="直線單箭頭接點 45"/>
+          <p:cNvCxnSpPr>
+            <a:cxnSpLocks/>
+          </p:cNvCxnSpPr>
+          <p:nvPr/>
+        </p:nvCxnSpPr>
+        <p:spPr>
+          <a:xfrm>
+            <a:off x="3455868" y="4941168"/>
+            <a:ext cx="0" cy="493531"/>
+          </a:xfrm>
+          <a:prstGeom prst="straightConnector1">
+            <a:avLst/>
+          </a:prstGeom>
+          <a:ln w="28575">
+            <a:tailEnd type="arrow"/>
+          </a:ln>
+        </p:spPr>
+        <p:style>
+          <a:lnRef idx="1">
+            <a:schemeClr val="dk1"/>
+          </a:lnRef>
+          <a:fillRef idx="0">
+            <a:schemeClr val="dk1"/>
+          </a:fillRef>
+          <a:effectRef idx="0">
+            <a:schemeClr val="dk1"/>
+          </a:effectRef>
+          <a:fontRef idx="minor">
+            <a:schemeClr val="tx1"/>
+          </a:fontRef>
+        </p:style>
+      </p:cxnSp>
+      <p:sp>
+        <p:nvSpPr>
+          <p:cNvPr id="2" name="矩形 1">
+            <a:extLst>
+              <a:ext uri="{FF2B5EF4-FFF2-40B4-BE49-F238E27FC236}">
+                <a16:creationId xmlns:a16="http://schemas.microsoft.com/office/drawing/2014/main" id="{91BDF42B-0475-41BB-85B6-1FF0B3A4FE14}"/>
+              </a:ext>
+            </a:extLst>
+          </p:cNvPr>
+          <p:cNvSpPr/>
+          <p:nvPr/>
+        </p:nvSpPr>
+        <p:spPr>
+          <a:xfrm>
+            <a:off x="3995936" y="116632"/>
+            <a:ext cx="1620180" cy="576064"/>
+          </a:xfrm>
+          <a:prstGeom prst="rect">
+            <a:avLst/>
+          </a:prstGeom>
+        </p:spPr>
+        <p:style>
+          <a:lnRef idx="1">
+            <a:schemeClr val="dk1"/>
+          </a:lnRef>
+          <a:fillRef idx="2">
+            <a:schemeClr val="dk1"/>
+          </a:fillRef>
+          <a:effectRef idx="1">
+            <a:schemeClr val="dk1"/>
+          </a:effectRef>
+          <a:fontRef idx="minor">
+            <a:schemeClr val="dk1"/>
+          </a:fontRef>
+        </p:style>
+        <p:txBody>
+          <a:bodyPr rtlCol="0" anchor="ctr"/>
+          <a:lstStyle/>
+          <a:p>
+            <a:pPr algn="ctr"/>
+            <a:r>
+              <a:rPr lang="en-US" altLang="zh-TW" dirty="0"/>
+              <a:t>Data</a:t>
+            </a:r>
+          </a:p>
+          <a:p>
+            <a:pPr algn="ctr"/>
+            <a:r>
+              <a:rPr lang="en-US" altLang="zh-TW" dirty="0"/>
+              <a:t>(Train and Test)</a:t>
+            </a:r>
+            <a:endParaRPr lang="zh-TW" altLang="en-US" dirty="0"/>
+          </a:p>
+        </p:txBody>
+      </p:sp>
+      <p:sp>
+        <p:nvSpPr>
+          <p:cNvPr id="37" name="流程圖: 程序 36">
+            <a:extLst>
+              <a:ext uri="{FF2B5EF4-FFF2-40B4-BE49-F238E27FC236}">
+                <a16:creationId xmlns:a16="http://schemas.microsoft.com/office/drawing/2014/main" id="{36BC64BB-F69D-4CD3-ACEA-427E8363E253}"/>
+              </a:ext>
+            </a:extLst>
+          </p:cNvPr>
+          <p:cNvSpPr/>
+          <p:nvPr/>
+        </p:nvSpPr>
+        <p:spPr>
+          <a:xfrm>
+            <a:off x="2483768" y="5517232"/>
+            <a:ext cx="4574703" cy="720080"/>
+          </a:xfrm>
+          <a:prstGeom prst="flowChartProcess">
+            <a:avLst/>
+          </a:prstGeom>
+          <a:solidFill>
+            <a:schemeClr val="accent6">
+              <a:alpha val="50000"/>
+            </a:schemeClr>
+          </a:solidFill>
+          <a:ln>
+            <a:noFill/>
+          </a:ln>
+        </p:spPr>
+        <p:style>
+          <a:lnRef idx="0">
+            <a:scrgbClr r="0" g="0" b="0"/>
+          </a:lnRef>
+          <a:fillRef idx="0">
+            <a:scrgbClr r="0" g="0" b="0"/>
+          </a:fillRef>
+          <a:effectRef idx="0">
+            <a:scrgbClr r="0" g="0" b="0"/>
+          </a:effectRef>
+          <a:fontRef idx="minor">
+            <a:schemeClr val="lt1"/>
+          </a:fontRef>
+        </p:style>
+        <p:txBody>
+          <a:bodyPr rtlCol="0" anchor="ctr"/>
+          <a:lstStyle/>
+          <a:p>
+            <a:pPr algn="ctr"/>
+            <a:r>
+              <a:rPr lang="en-US" altLang="zh-TW" sz="2400" dirty="0"/>
+              <a:t>Meta-Model</a:t>
+            </a:r>
+          </a:p>
+          <a:p>
+            <a:pPr algn="ctr"/>
+            <a:r>
+              <a:rPr lang="en-US" altLang="zh-TW" sz="2400" dirty="0"/>
+              <a:t>(Blender / meta learner)</a:t>
+            </a:r>
+            <a:endParaRPr lang="zh-TW" altLang="en-US" sz="2400" dirty="0"/>
+          </a:p>
+        </p:txBody>
+      </p:sp>
+      <p:sp>
+        <p:nvSpPr>
+          <p:cNvPr id="45" name="文字方塊 44">
+            <a:extLst>
+              <a:ext uri="{FF2B5EF4-FFF2-40B4-BE49-F238E27FC236}">
+                <a16:creationId xmlns:a16="http://schemas.microsoft.com/office/drawing/2014/main" id="{AC3F0889-ACE9-42FF-A6F1-D11524473F3D}"/>
+              </a:ext>
+            </a:extLst>
+          </p:cNvPr>
+          <p:cNvSpPr txBox="1"/>
+          <p:nvPr/>
+        </p:nvSpPr>
+        <p:spPr>
+          <a:xfrm>
+            <a:off x="6173924" y="4995144"/>
+            <a:ext cx="2430523" cy="369332"/>
+          </a:xfrm>
+          <a:prstGeom prst="rect">
+            <a:avLst/>
+          </a:prstGeom>
+          <a:noFill/>
+        </p:spPr>
+        <p:txBody>
+          <a:bodyPr wrap="square" rtlCol="0">
+            <a:spAutoFit/>
+          </a:bodyPr>
+          <a:lstStyle/>
+          <a:p>
+            <a:r>
+              <a:rPr lang="en-US" altLang="zh-TW" dirty="0"/>
+              <a:t>(Blending)</a:t>
+            </a:r>
+            <a:endParaRPr lang="zh-TW" altLang="en-US" dirty="0"/>
+          </a:p>
+        </p:txBody>
+      </p:sp>
+      <p:cxnSp>
+        <p:nvCxnSpPr>
+          <p:cNvPr id="40" name="直線單箭頭接點 39">
+            <a:extLst>
+              <a:ext uri="{FF2B5EF4-FFF2-40B4-BE49-F238E27FC236}">
+                <a16:creationId xmlns:a16="http://schemas.microsoft.com/office/drawing/2014/main" id="{2A1D3AEE-244F-43AC-B743-5EF744120A54}"/>
+              </a:ext>
+            </a:extLst>
+          </p:cNvPr>
+          <p:cNvCxnSpPr>
+            <a:cxnSpLocks/>
+          </p:cNvCxnSpPr>
+          <p:nvPr/>
+        </p:nvCxnSpPr>
+        <p:spPr>
+          <a:xfrm>
+            <a:off x="4806026" y="2267580"/>
+            <a:ext cx="0" cy="369332"/>
+          </a:xfrm>
+          <a:prstGeom prst="straightConnector1">
+            <a:avLst/>
+          </a:prstGeom>
+          <a:ln w="28575">
+            <a:tailEnd type="arrow"/>
+          </a:ln>
+        </p:spPr>
+        <p:style>
+          <a:lnRef idx="1">
+            <a:schemeClr val="dk1"/>
+          </a:lnRef>
+          <a:fillRef idx="0">
+            <a:schemeClr val="dk1"/>
+          </a:fillRef>
+          <a:effectRef idx="0">
+            <a:schemeClr val="dk1"/>
+          </a:effectRef>
+          <a:fontRef idx="minor">
+            <a:schemeClr val="tx1"/>
+          </a:fontRef>
+        </p:style>
+      </p:cxnSp>
+      <p:cxnSp>
+        <p:nvCxnSpPr>
+          <p:cNvPr id="43" name="直線單箭頭接點 42">
+            <a:extLst>
+              <a:ext uri="{FF2B5EF4-FFF2-40B4-BE49-F238E27FC236}">
+                <a16:creationId xmlns:a16="http://schemas.microsoft.com/office/drawing/2014/main" id="{6373529C-09A6-4D4D-B662-BF5FC7F36075}"/>
+              </a:ext>
+            </a:extLst>
+          </p:cNvPr>
+          <p:cNvCxnSpPr>
+            <a:cxnSpLocks/>
+          </p:cNvCxnSpPr>
+          <p:nvPr/>
+        </p:nvCxnSpPr>
+        <p:spPr>
+          <a:xfrm>
+            <a:off x="6555668" y="2267580"/>
+            <a:ext cx="0" cy="369332"/>
+          </a:xfrm>
+          <a:prstGeom prst="straightConnector1">
+            <a:avLst/>
+          </a:prstGeom>
+          <a:ln w="28575">
+            <a:tailEnd type="arrow"/>
+          </a:ln>
+        </p:spPr>
+        <p:style>
+          <a:lnRef idx="1">
+            <a:schemeClr val="dk1"/>
+          </a:lnRef>
+          <a:fillRef idx="0">
+            <a:schemeClr val="dk1"/>
+          </a:fillRef>
+          <a:effectRef idx="0">
+            <a:schemeClr val="dk1"/>
+          </a:effectRef>
+          <a:fontRef idx="minor">
+            <a:schemeClr val="tx1"/>
+          </a:fontRef>
+        </p:style>
+      </p:cxnSp>
+      <p:cxnSp>
+        <p:nvCxnSpPr>
+          <p:cNvPr id="47" name="直線單箭頭接點 46">
+            <a:extLst>
+              <a:ext uri="{FF2B5EF4-FFF2-40B4-BE49-F238E27FC236}">
+                <a16:creationId xmlns:a16="http://schemas.microsoft.com/office/drawing/2014/main" id="{07DE7923-128C-4B4F-8847-84A7DDDFE5F4}"/>
+              </a:ext>
+            </a:extLst>
+          </p:cNvPr>
+          <p:cNvCxnSpPr>
+            <a:cxnSpLocks/>
+            <a:endCxn id="23" idx="0"/>
+          </p:cNvCxnSpPr>
+          <p:nvPr/>
+        </p:nvCxnSpPr>
+        <p:spPr>
+          <a:xfrm flipH="1">
+            <a:off x="3455868" y="3200138"/>
+            <a:ext cx="1368162" cy="732918"/>
+          </a:xfrm>
+          <a:prstGeom prst="straightConnector1">
+            <a:avLst/>
+          </a:prstGeom>
+          <a:ln w="28575">
+            <a:tailEnd type="arrow"/>
+          </a:ln>
+        </p:spPr>
+        <p:style>
+          <a:lnRef idx="1">
+            <a:schemeClr val="dk1"/>
+          </a:lnRef>
+          <a:fillRef idx="0">
+            <a:schemeClr val="dk1"/>
+          </a:fillRef>
+          <a:effectRef idx="0">
+            <a:schemeClr val="dk1"/>
+          </a:effectRef>
+          <a:fontRef idx="minor">
+            <a:schemeClr val="tx1"/>
+          </a:fontRef>
+        </p:style>
+      </p:cxnSp>
+      <p:sp>
+        <p:nvSpPr>
+          <p:cNvPr id="23" name="矩形 22">
+            <a:extLst>
+              <a:ext uri="{FF2B5EF4-FFF2-40B4-BE49-F238E27FC236}">
+                <a16:creationId xmlns:a16="http://schemas.microsoft.com/office/drawing/2014/main" id="{EB612220-5242-474D-90D8-E3634B701B4F}"/>
+              </a:ext>
+            </a:extLst>
+          </p:cNvPr>
+          <p:cNvSpPr/>
+          <p:nvPr/>
+        </p:nvSpPr>
+        <p:spPr>
+          <a:xfrm>
+            <a:off x="2483768" y="3933056"/>
+            <a:ext cx="1944200" cy="912091"/>
+          </a:xfrm>
+          <a:prstGeom prst="rect">
+            <a:avLst/>
+          </a:prstGeom>
+          <a:ln w="19050"/>
+        </p:spPr>
+        <p:style>
+          <a:lnRef idx="2">
+            <a:schemeClr val="dk1"/>
+          </a:lnRef>
+          <a:fillRef idx="1">
+            <a:schemeClr val="lt1"/>
+          </a:fillRef>
+          <a:effectRef idx="0">
+            <a:schemeClr val="dk1"/>
+          </a:effectRef>
+          <a:fontRef idx="minor">
+            <a:schemeClr val="dk1"/>
+          </a:fontRef>
+        </p:style>
+        <p:txBody>
+          <a:bodyPr rtlCol="0" anchor="ctr"/>
+          <a:lstStyle/>
+          <a:p>
+            <a:pPr algn="ctr"/>
+            <a:endParaRPr lang="zh-TW" altLang="en-US" dirty="0"/>
+          </a:p>
+        </p:txBody>
+      </p:sp>
+      <p:sp>
+        <p:nvSpPr>
+          <p:cNvPr id="57" name="矩形 56">
+            <a:extLst>
+              <a:ext uri="{FF2B5EF4-FFF2-40B4-BE49-F238E27FC236}">
+                <a16:creationId xmlns:a16="http://schemas.microsoft.com/office/drawing/2014/main" id="{5FBDB747-2A9D-4C3C-AFBF-9839E6A6AD06}"/>
+              </a:ext>
+            </a:extLst>
+          </p:cNvPr>
+          <p:cNvSpPr/>
+          <p:nvPr/>
+        </p:nvSpPr>
+        <p:spPr>
+          <a:xfrm>
+            <a:off x="5114281" y="3930297"/>
+            <a:ext cx="1944200" cy="912091"/>
+          </a:xfrm>
+          <a:prstGeom prst="rect">
+            <a:avLst/>
+          </a:prstGeom>
+          <a:ln w="19050"/>
+        </p:spPr>
+        <p:style>
+          <a:lnRef idx="2">
+            <a:schemeClr val="dk1"/>
+          </a:lnRef>
+          <a:fillRef idx="1">
+            <a:schemeClr val="lt1"/>
+          </a:fillRef>
+          <a:effectRef idx="0">
+            <a:schemeClr val="dk1"/>
+          </a:effectRef>
+          <a:fontRef idx="minor">
+            <a:schemeClr val="dk1"/>
+          </a:fontRef>
+        </p:style>
+        <p:txBody>
+          <a:bodyPr rtlCol="0" anchor="ctr"/>
+          <a:lstStyle/>
+          <a:p>
+            <a:pPr algn="ctr"/>
+            <a:endParaRPr lang="zh-TW" altLang="en-US" dirty="0"/>
+          </a:p>
+        </p:txBody>
+      </p:sp>
+      <p:cxnSp>
+        <p:nvCxnSpPr>
+          <p:cNvPr id="64" name="直線單箭頭接點 63">
+            <a:extLst>
+              <a:ext uri="{FF2B5EF4-FFF2-40B4-BE49-F238E27FC236}">
+                <a16:creationId xmlns:a16="http://schemas.microsoft.com/office/drawing/2014/main" id="{F77BD9DE-98AD-45C1-835B-E1BBE65EF4E8}"/>
+              </a:ext>
+            </a:extLst>
+          </p:cNvPr>
+          <p:cNvCxnSpPr>
+            <a:cxnSpLocks/>
+            <a:endCxn id="57" idx="0"/>
+          </p:cNvCxnSpPr>
+          <p:nvPr/>
+        </p:nvCxnSpPr>
+        <p:spPr>
+          <a:xfrm>
+            <a:off x="4806026" y="3210748"/>
+            <a:ext cx="1280355" cy="719549"/>
+          </a:xfrm>
+          <a:prstGeom prst="straightConnector1">
+            <a:avLst/>
+          </a:prstGeom>
+          <a:ln w="28575">
+            <a:tailEnd type="arrow"/>
+          </a:ln>
+        </p:spPr>
+        <p:style>
+          <a:lnRef idx="1">
+            <a:schemeClr val="dk1"/>
+          </a:lnRef>
+          <a:fillRef idx="0">
+            <a:schemeClr val="dk1"/>
+          </a:fillRef>
+          <a:effectRef idx="0">
+            <a:schemeClr val="dk1"/>
+          </a:effectRef>
+          <a:fontRef idx="minor">
+            <a:schemeClr val="tx1"/>
+          </a:fontRef>
+        </p:style>
+      </p:cxnSp>
+      <p:sp>
+        <p:nvSpPr>
+          <p:cNvPr id="65" name="文字方塊 64">
+            <a:extLst>
+              <a:ext uri="{FF2B5EF4-FFF2-40B4-BE49-F238E27FC236}">
+                <a16:creationId xmlns:a16="http://schemas.microsoft.com/office/drawing/2014/main" id="{4F8BE141-4D3F-40E0-A398-6333E3B42488}"/>
+              </a:ext>
+            </a:extLst>
+          </p:cNvPr>
+          <p:cNvSpPr txBox="1"/>
+          <p:nvPr/>
+        </p:nvSpPr>
+        <p:spPr>
+          <a:xfrm>
+            <a:off x="2253221" y="4946093"/>
+            <a:ext cx="1068113" cy="923330"/>
+          </a:xfrm>
+          <a:prstGeom prst="rect">
+            <a:avLst/>
+          </a:prstGeom>
+          <a:noFill/>
+        </p:spPr>
+        <p:txBody>
+          <a:bodyPr wrap="square" rtlCol="0">
+            <a:spAutoFit/>
+          </a:bodyPr>
+          <a:lstStyle/>
+          <a:p>
+            <a:r>
+              <a:rPr lang="en-US" altLang="zh-TW" dirty="0"/>
+              <a:t>(Training)</a:t>
+            </a:r>
+            <a:endParaRPr lang="zh-TW" altLang="en-US" dirty="0"/>
+          </a:p>
+        </p:txBody>
+      </p:sp>
+      <p:cxnSp>
+        <p:nvCxnSpPr>
+          <p:cNvPr id="66" name="直線單箭頭接點 65">
+            <a:extLst>
+              <a:ext uri="{FF2B5EF4-FFF2-40B4-BE49-F238E27FC236}">
+                <a16:creationId xmlns:a16="http://schemas.microsoft.com/office/drawing/2014/main" id="{3F0C158B-3D94-4BF6-9158-68A4A1C01F81}"/>
+              </a:ext>
+            </a:extLst>
+          </p:cNvPr>
+          <p:cNvCxnSpPr>
+            <a:cxnSpLocks/>
+          </p:cNvCxnSpPr>
+          <p:nvPr/>
+        </p:nvCxnSpPr>
+        <p:spPr>
+          <a:xfrm>
+            <a:off x="6084674" y="4941167"/>
+            <a:ext cx="0" cy="576065"/>
+          </a:xfrm>
+          <a:prstGeom prst="straightConnector1">
+            <a:avLst/>
+          </a:prstGeom>
+          <a:ln w="28575">
+            <a:tailEnd type="arrow"/>
+          </a:ln>
+        </p:spPr>
+        <p:style>
+          <a:lnRef idx="1">
+            <a:schemeClr val="dk1"/>
+          </a:lnRef>
+          <a:fillRef idx="0">
+            <a:schemeClr val="dk1"/>
+          </a:fillRef>
+          <a:effectRef idx="0">
+            <a:schemeClr val="dk1"/>
+          </a:effectRef>
+          <a:fontRef idx="minor">
+            <a:schemeClr val="tx1"/>
+          </a:fontRef>
+        </p:style>
+      </p:cxnSp>
+      <p:cxnSp>
+        <p:nvCxnSpPr>
+          <p:cNvPr id="69" name="直線單箭頭接點 68">
+            <a:extLst>
+              <a:ext uri="{FF2B5EF4-FFF2-40B4-BE49-F238E27FC236}">
+                <a16:creationId xmlns:a16="http://schemas.microsoft.com/office/drawing/2014/main" id="{32EADD34-6B52-49D2-A4CD-16292145BF03}"/>
+              </a:ext>
+            </a:extLst>
+          </p:cNvPr>
+          <p:cNvCxnSpPr>
+            <a:cxnSpLocks/>
+          </p:cNvCxnSpPr>
+          <p:nvPr/>
+        </p:nvCxnSpPr>
+        <p:spPr>
+          <a:xfrm>
+            <a:off x="6101923" y="6237312"/>
+            <a:ext cx="0" cy="576065"/>
+          </a:xfrm>
+          <a:prstGeom prst="straightConnector1">
+            <a:avLst/>
+          </a:prstGeom>
+          <a:ln w="28575">
+            <a:tailEnd type="arrow"/>
+          </a:ln>
+        </p:spPr>
+        <p:style>
+          <a:lnRef idx="1">
+            <a:schemeClr val="dk1"/>
+          </a:lnRef>
+          <a:fillRef idx="0">
+            <a:schemeClr val="dk1"/>
+          </a:fillRef>
+          <a:effectRef idx="0">
+            <a:schemeClr val="dk1"/>
+          </a:effectRef>
+          <a:fontRef idx="minor">
+            <a:schemeClr val="tx1"/>
+          </a:fontRef>
+        </p:style>
+      </p:cxnSp>
+      <p:sp>
+        <p:nvSpPr>
+          <p:cNvPr id="3" name="文字方塊 2">
+            <a:extLst>
+              <a:ext uri="{FF2B5EF4-FFF2-40B4-BE49-F238E27FC236}">
+                <a16:creationId xmlns:a16="http://schemas.microsoft.com/office/drawing/2014/main" id="{0A68B227-45AB-448C-9613-2A42B8F40FBF}"/>
+              </a:ext>
+            </a:extLst>
+          </p:cNvPr>
+          <p:cNvSpPr txBox="1"/>
+          <p:nvPr/>
+        </p:nvSpPr>
+        <p:spPr>
+          <a:xfrm>
+            <a:off x="2292851" y="2713674"/>
+            <a:ext cx="720134" cy="307777"/>
+          </a:xfrm>
+          <a:prstGeom prst="rect">
+            <a:avLst/>
+          </a:prstGeom>
+          <a:noFill/>
+          <a:ln>
+            <a:solidFill>
+              <a:schemeClr val="tx1"/>
+            </a:solidFill>
+          </a:ln>
+        </p:spPr>
+        <p:txBody>
+          <a:bodyPr wrap="none" rtlCol="0">
+            <a:spAutoFit/>
+          </a:bodyPr>
+          <a:lstStyle/>
+          <a:p>
+            <a:r>
+              <a:rPr lang="en-US" altLang="zh-TW" sz="1400" dirty="0"/>
+              <a:t>Meta-X</a:t>
+            </a:r>
+            <a:endParaRPr lang="zh-TW" altLang="en-US" sz="1400" dirty="0"/>
+          </a:p>
+        </p:txBody>
+      </p:sp>
+      <p:sp>
+        <p:nvSpPr>
+          <p:cNvPr id="49" name="文字方塊 48">
+            <a:extLst>
+              <a:ext uri="{FF2B5EF4-FFF2-40B4-BE49-F238E27FC236}">
+                <a16:creationId xmlns:a16="http://schemas.microsoft.com/office/drawing/2014/main" id="{8B323345-BF87-4E60-BE58-B98362795AAB}"/>
+              </a:ext>
+            </a:extLst>
+          </p:cNvPr>
+          <p:cNvSpPr txBox="1"/>
+          <p:nvPr/>
+        </p:nvSpPr>
+        <p:spPr>
+          <a:xfrm>
+            <a:off x="3096274" y="2706607"/>
+            <a:ext cx="715324" cy="307777"/>
+          </a:xfrm>
+          <a:prstGeom prst="rect">
+            <a:avLst/>
+          </a:prstGeom>
+          <a:noFill/>
+          <a:ln>
+            <a:solidFill>
+              <a:schemeClr val="tx1"/>
+            </a:solidFill>
+          </a:ln>
+        </p:spPr>
+        <p:txBody>
+          <a:bodyPr wrap="none" rtlCol="0">
+            <a:spAutoFit/>
+          </a:bodyPr>
+          <a:lstStyle/>
+          <a:p>
+            <a:r>
+              <a:rPr lang="en-US" altLang="zh-TW" sz="1400" dirty="0"/>
+              <a:t>Meta-Y</a:t>
+            </a:r>
+            <a:endParaRPr lang="zh-TW" altLang="en-US" sz="1400" dirty="0"/>
+          </a:p>
+        </p:txBody>
+      </p:sp>
+      <p:sp>
+        <p:nvSpPr>
+          <p:cNvPr id="51" name="文字方塊 50">
+            <a:extLst>
+              <a:ext uri="{FF2B5EF4-FFF2-40B4-BE49-F238E27FC236}">
+                <a16:creationId xmlns:a16="http://schemas.microsoft.com/office/drawing/2014/main" id="{05632530-0358-49CC-98AC-883A31DEC54F}"/>
+              </a:ext>
+            </a:extLst>
+          </p:cNvPr>
+          <p:cNvSpPr txBox="1"/>
+          <p:nvPr/>
+        </p:nvSpPr>
+        <p:spPr>
+          <a:xfrm>
+            <a:off x="4055565" y="2717287"/>
+            <a:ext cx="720134" cy="307777"/>
+          </a:xfrm>
+          <a:prstGeom prst="rect">
+            <a:avLst/>
+          </a:prstGeom>
+          <a:noFill/>
+          <a:ln>
+            <a:solidFill>
+              <a:schemeClr val="tx1"/>
+            </a:solidFill>
+          </a:ln>
+        </p:spPr>
+        <p:txBody>
+          <a:bodyPr wrap="none" rtlCol="0">
+            <a:spAutoFit/>
+          </a:bodyPr>
+          <a:lstStyle/>
+          <a:p>
+            <a:r>
+              <a:rPr lang="en-US" altLang="zh-TW" sz="1400" dirty="0"/>
+              <a:t>Meta-X</a:t>
+            </a:r>
+            <a:endParaRPr lang="zh-TW" altLang="en-US" sz="1400" dirty="0"/>
+          </a:p>
+        </p:txBody>
+      </p:sp>
+      <p:sp>
+        <p:nvSpPr>
+          <p:cNvPr id="52" name="文字方塊 51">
+            <a:extLst>
+              <a:ext uri="{FF2B5EF4-FFF2-40B4-BE49-F238E27FC236}">
+                <a16:creationId xmlns:a16="http://schemas.microsoft.com/office/drawing/2014/main" id="{711DA64E-2849-4580-97F6-E0CB4073F873}"/>
+              </a:ext>
+            </a:extLst>
+          </p:cNvPr>
+          <p:cNvSpPr txBox="1"/>
+          <p:nvPr/>
+        </p:nvSpPr>
+        <p:spPr>
+          <a:xfrm>
+            <a:off x="4858988" y="2710220"/>
+            <a:ext cx="715324" cy="307777"/>
+          </a:xfrm>
+          <a:prstGeom prst="rect">
+            <a:avLst/>
+          </a:prstGeom>
+          <a:noFill/>
+          <a:ln>
+            <a:solidFill>
+              <a:schemeClr val="tx1"/>
+            </a:solidFill>
+          </a:ln>
+        </p:spPr>
+        <p:txBody>
+          <a:bodyPr wrap="none" rtlCol="0">
+            <a:spAutoFit/>
+          </a:bodyPr>
+          <a:lstStyle/>
+          <a:p>
+            <a:r>
+              <a:rPr lang="en-US" altLang="zh-TW" sz="1400" dirty="0"/>
+              <a:t>Meta-Y</a:t>
+            </a:r>
+            <a:endParaRPr lang="zh-TW" altLang="en-US" sz="1400" dirty="0"/>
+          </a:p>
+        </p:txBody>
+      </p:sp>
+      <p:sp>
+        <p:nvSpPr>
+          <p:cNvPr id="54" name="文字方塊 53">
+            <a:extLst>
+              <a:ext uri="{FF2B5EF4-FFF2-40B4-BE49-F238E27FC236}">
+                <a16:creationId xmlns:a16="http://schemas.microsoft.com/office/drawing/2014/main" id="{13650205-407C-411D-B297-3130CD2D91EA}"/>
+              </a:ext>
+            </a:extLst>
+          </p:cNvPr>
+          <p:cNvSpPr txBox="1"/>
+          <p:nvPr/>
+        </p:nvSpPr>
+        <p:spPr>
+          <a:xfrm>
+            <a:off x="5818279" y="2713674"/>
+            <a:ext cx="720134" cy="307777"/>
+          </a:xfrm>
+          <a:prstGeom prst="rect">
+            <a:avLst/>
+          </a:prstGeom>
+          <a:noFill/>
+          <a:ln>
+            <a:solidFill>
+              <a:schemeClr val="tx1"/>
+            </a:solidFill>
+          </a:ln>
+        </p:spPr>
+        <p:txBody>
+          <a:bodyPr wrap="none" rtlCol="0">
+            <a:spAutoFit/>
+          </a:bodyPr>
+          <a:lstStyle/>
+          <a:p>
+            <a:r>
+              <a:rPr lang="en-US" altLang="zh-TW" sz="1400" dirty="0"/>
+              <a:t>Meta-X</a:t>
+            </a:r>
+            <a:endParaRPr lang="zh-TW" altLang="en-US" sz="1400" dirty="0"/>
+          </a:p>
+        </p:txBody>
+      </p:sp>
+      <p:sp>
+        <p:nvSpPr>
+          <p:cNvPr id="56" name="文字方塊 55">
+            <a:extLst>
+              <a:ext uri="{FF2B5EF4-FFF2-40B4-BE49-F238E27FC236}">
+                <a16:creationId xmlns:a16="http://schemas.microsoft.com/office/drawing/2014/main" id="{B2C6F2C1-8527-4AB1-8C4F-D7ABE097783C}"/>
+              </a:ext>
+            </a:extLst>
+          </p:cNvPr>
+          <p:cNvSpPr txBox="1"/>
+          <p:nvPr/>
+        </p:nvSpPr>
+        <p:spPr>
+          <a:xfrm>
+            <a:off x="6621702" y="2706607"/>
+            <a:ext cx="715324" cy="307777"/>
+          </a:xfrm>
+          <a:prstGeom prst="rect">
+            <a:avLst/>
+          </a:prstGeom>
+          <a:noFill/>
+          <a:ln>
+            <a:solidFill>
+              <a:schemeClr val="tx1"/>
+            </a:solidFill>
+          </a:ln>
+        </p:spPr>
+        <p:txBody>
+          <a:bodyPr wrap="none" rtlCol="0">
+            <a:spAutoFit/>
+          </a:bodyPr>
+          <a:lstStyle/>
+          <a:p>
+            <a:r>
+              <a:rPr lang="en-US" altLang="zh-TW" sz="1400" dirty="0"/>
+              <a:t>Meta-Y</a:t>
+            </a:r>
+            <a:endParaRPr lang="zh-TW" altLang="en-US" sz="1400" dirty="0"/>
+          </a:p>
+        </p:txBody>
+      </p:sp>
+      <p:sp>
+        <p:nvSpPr>
+          <p:cNvPr id="58" name="文字方塊 57">
+            <a:extLst>
+              <a:ext uri="{FF2B5EF4-FFF2-40B4-BE49-F238E27FC236}">
+                <a16:creationId xmlns:a16="http://schemas.microsoft.com/office/drawing/2014/main" id="{62592324-E26E-480C-BFE5-FB4801D0AC47}"/>
+              </a:ext>
+            </a:extLst>
+          </p:cNvPr>
+          <p:cNvSpPr txBox="1"/>
+          <p:nvPr/>
+        </p:nvSpPr>
+        <p:spPr>
+          <a:xfrm>
+            <a:off x="2652918" y="4009818"/>
+            <a:ext cx="720134" cy="307777"/>
+          </a:xfrm>
+          <a:prstGeom prst="rect">
+            <a:avLst/>
+          </a:prstGeom>
+          <a:noFill/>
+          <a:ln>
+            <a:solidFill>
+              <a:schemeClr val="tx1"/>
+            </a:solidFill>
+          </a:ln>
+        </p:spPr>
+        <p:txBody>
+          <a:bodyPr wrap="none" rtlCol="0">
+            <a:spAutoFit/>
+          </a:bodyPr>
+          <a:lstStyle/>
+          <a:p>
+            <a:r>
+              <a:rPr lang="en-US" altLang="zh-TW" sz="1400" dirty="0"/>
+              <a:t>Meta-X</a:t>
+            </a:r>
+            <a:endParaRPr lang="zh-TW" altLang="en-US" sz="1400" dirty="0"/>
+          </a:p>
+        </p:txBody>
+      </p:sp>
+      <p:sp>
+        <p:nvSpPr>
+          <p:cNvPr id="60" name="文字方塊 59">
+            <a:extLst>
+              <a:ext uri="{FF2B5EF4-FFF2-40B4-BE49-F238E27FC236}">
+                <a16:creationId xmlns:a16="http://schemas.microsoft.com/office/drawing/2014/main" id="{D791D341-38D3-4A2F-80A1-5B80C354246F}"/>
+              </a:ext>
+            </a:extLst>
+          </p:cNvPr>
+          <p:cNvSpPr txBox="1"/>
+          <p:nvPr/>
+        </p:nvSpPr>
+        <p:spPr>
+          <a:xfrm>
+            <a:off x="3528937" y="4004076"/>
+            <a:ext cx="720134" cy="307777"/>
+          </a:xfrm>
+          <a:prstGeom prst="rect">
+            <a:avLst/>
+          </a:prstGeom>
+          <a:noFill/>
+          <a:ln>
+            <a:solidFill>
+              <a:schemeClr val="tx1"/>
+            </a:solidFill>
+          </a:ln>
+        </p:spPr>
+        <p:txBody>
+          <a:bodyPr wrap="none" rtlCol="0">
+            <a:spAutoFit/>
+          </a:bodyPr>
+          <a:lstStyle/>
+          <a:p>
+            <a:r>
+              <a:rPr lang="en-US" altLang="zh-TW" sz="1400" dirty="0"/>
+              <a:t>Meta-X</a:t>
+            </a:r>
+            <a:endParaRPr lang="zh-TW" altLang="en-US" sz="1400" dirty="0"/>
+          </a:p>
+        </p:txBody>
+      </p:sp>
+      <p:sp>
+        <p:nvSpPr>
+          <p:cNvPr id="67" name="文字方塊 66">
+            <a:extLst>
+              <a:ext uri="{FF2B5EF4-FFF2-40B4-BE49-F238E27FC236}">
+                <a16:creationId xmlns:a16="http://schemas.microsoft.com/office/drawing/2014/main" id="{8BF6EE61-72B3-4CE0-84C1-969B9BBDB8D8}"/>
+              </a:ext>
+            </a:extLst>
+          </p:cNvPr>
+          <p:cNvSpPr txBox="1"/>
+          <p:nvPr/>
+        </p:nvSpPr>
+        <p:spPr>
+          <a:xfrm>
+            <a:off x="3101603" y="4409854"/>
+            <a:ext cx="720134" cy="307777"/>
+          </a:xfrm>
+          <a:prstGeom prst="rect">
+            <a:avLst/>
+          </a:prstGeom>
+          <a:noFill/>
+          <a:ln>
+            <a:solidFill>
+              <a:schemeClr val="tx1"/>
+            </a:solidFill>
+          </a:ln>
+        </p:spPr>
+        <p:txBody>
+          <a:bodyPr wrap="none" rtlCol="0">
+            <a:spAutoFit/>
+          </a:bodyPr>
+          <a:lstStyle/>
+          <a:p>
+            <a:r>
+              <a:rPr lang="en-US" altLang="zh-TW" sz="1400" dirty="0"/>
+              <a:t>Meta-X</a:t>
+            </a:r>
+            <a:endParaRPr lang="zh-TW" altLang="en-US" sz="1400" dirty="0"/>
+          </a:p>
+        </p:txBody>
+      </p:sp>
+      <p:sp>
+        <p:nvSpPr>
+          <p:cNvPr id="68" name="文字方塊 67">
+            <a:extLst>
+              <a:ext uri="{FF2B5EF4-FFF2-40B4-BE49-F238E27FC236}">
+                <a16:creationId xmlns:a16="http://schemas.microsoft.com/office/drawing/2014/main" id="{87F0A0A4-DB43-4C61-B4B9-C1A4CF64146C}"/>
+              </a:ext>
+            </a:extLst>
+          </p:cNvPr>
+          <p:cNvSpPr txBox="1"/>
+          <p:nvPr/>
+        </p:nvSpPr>
+        <p:spPr>
+          <a:xfrm>
+            <a:off x="5306195" y="4004076"/>
+            <a:ext cx="715324" cy="307777"/>
+          </a:xfrm>
+          <a:prstGeom prst="rect">
+            <a:avLst/>
+          </a:prstGeom>
+          <a:noFill/>
+          <a:ln>
+            <a:solidFill>
+              <a:schemeClr val="tx1"/>
+            </a:solidFill>
+          </a:ln>
+        </p:spPr>
+        <p:txBody>
+          <a:bodyPr wrap="none" rtlCol="0">
+            <a:spAutoFit/>
+          </a:bodyPr>
+          <a:lstStyle/>
+          <a:p>
+            <a:r>
+              <a:rPr lang="en-US" altLang="zh-TW" sz="1400" dirty="0"/>
+              <a:t>Meta-Y</a:t>
+            </a:r>
+            <a:endParaRPr lang="zh-TW" altLang="en-US" sz="1400" dirty="0"/>
+          </a:p>
+        </p:txBody>
+      </p:sp>
+      <p:sp>
+        <p:nvSpPr>
+          <p:cNvPr id="70" name="文字方塊 69">
+            <a:extLst>
+              <a:ext uri="{FF2B5EF4-FFF2-40B4-BE49-F238E27FC236}">
+                <a16:creationId xmlns:a16="http://schemas.microsoft.com/office/drawing/2014/main" id="{7BC1784E-7BBA-4863-9158-4DCF3A2D3227}"/>
+              </a:ext>
+            </a:extLst>
+          </p:cNvPr>
+          <p:cNvSpPr txBox="1"/>
+          <p:nvPr/>
+        </p:nvSpPr>
+        <p:spPr>
+          <a:xfrm>
+            <a:off x="6173924" y="4004076"/>
+            <a:ext cx="715324" cy="307777"/>
+          </a:xfrm>
+          <a:prstGeom prst="rect">
+            <a:avLst/>
+          </a:prstGeom>
+          <a:noFill/>
+          <a:ln>
+            <a:solidFill>
+              <a:schemeClr val="tx1"/>
+            </a:solidFill>
+          </a:ln>
+        </p:spPr>
+        <p:txBody>
+          <a:bodyPr wrap="none" rtlCol="0">
+            <a:spAutoFit/>
+          </a:bodyPr>
+          <a:lstStyle/>
+          <a:p>
+            <a:r>
+              <a:rPr lang="en-US" altLang="zh-TW" sz="1400" dirty="0"/>
+              <a:t>Meta-Y</a:t>
+            </a:r>
+            <a:endParaRPr lang="zh-TW" altLang="en-US" sz="1400" dirty="0"/>
+          </a:p>
+        </p:txBody>
+      </p:sp>
+      <p:sp>
+        <p:nvSpPr>
+          <p:cNvPr id="71" name="文字方塊 70">
+            <a:extLst>
+              <a:ext uri="{FF2B5EF4-FFF2-40B4-BE49-F238E27FC236}">
+                <a16:creationId xmlns:a16="http://schemas.microsoft.com/office/drawing/2014/main" id="{A27F7B21-72E4-4F98-AF07-1CADE843ABEA}"/>
+              </a:ext>
+            </a:extLst>
+          </p:cNvPr>
+          <p:cNvSpPr txBox="1"/>
+          <p:nvPr/>
+        </p:nvSpPr>
+        <p:spPr>
+          <a:xfrm>
+            <a:off x="5727012" y="4403124"/>
+            <a:ext cx="715324" cy="307777"/>
+          </a:xfrm>
+          <a:prstGeom prst="rect">
+            <a:avLst/>
+          </a:prstGeom>
+          <a:noFill/>
+          <a:ln>
+            <a:solidFill>
+              <a:schemeClr val="tx1"/>
+            </a:solidFill>
+          </a:ln>
+        </p:spPr>
+        <p:txBody>
+          <a:bodyPr wrap="none" rtlCol="0">
+            <a:spAutoFit/>
+          </a:bodyPr>
+          <a:lstStyle/>
+          <a:p>
+            <a:r>
+              <a:rPr lang="en-US" altLang="zh-TW" sz="1400" dirty="0"/>
+              <a:t>Meta-Y</a:t>
+            </a:r>
+            <a:endParaRPr lang="zh-TW" altLang="en-US" sz="1400" dirty="0"/>
+          </a:p>
+        </p:txBody>
+      </p:sp>
+      <p:sp>
+        <p:nvSpPr>
+          <p:cNvPr id="73" name="文字方塊 72">
+            <a:extLst>
+              <a:ext uri="{FF2B5EF4-FFF2-40B4-BE49-F238E27FC236}">
+                <a16:creationId xmlns:a16="http://schemas.microsoft.com/office/drawing/2014/main" id="{655CC631-FD24-4F32-A2B8-721C5CF4CAA0}"/>
+              </a:ext>
+            </a:extLst>
+          </p:cNvPr>
+          <p:cNvSpPr txBox="1"/>
+          <p:nvPr/>
+        </p:nvSpPr>
+        <p:spPr>
+          <a:xfrm>
+            <a:off x="4962124" y="6877921"/>
+            <a:ext cx="2279598" cy="461665"/>
+          </a:xfrm>
+          <a:prstGeom prst="rect">
+            <a:avLst/>
+          </a:prstGeom>
+          <a:noFill/>
+          <a:ln>
+            <a:solidFill>
+              <a:schemeClr val="tx1"/>
+            </a:solidFill>
+          </a:ln>
+        </p:spPr>
+        <p:txBody>
+          <a:bodyPr wrap="none" rtlCol="0">
+            <a:spAutoFit/>
+          </a:bodyPr>
+          <a:lstStyle/>
+          <a:p>
+            <a:r>
+              <a:rPr lang="en-US" altLang="zh-TW" sz="2400" dirty="0"/>
+              <a:t>Predicted results</a:t>
+            </a:r>
+            <a:endParaRPr lang="zh-TW" altLang="en-US" sz="2400" dirty="0"/>
+          </a:p>
+        </p:txBody>
+      </p:sp>
+    </p:spTree>
+    <p:extLst>
+      <p:ext uri="{BB962C8B-B14F-4D97-AF65-F5344CB8AC3E}">
+        <p14:creationId xmlns:p14="http://schemas.microsoft.com/office/powerpoint/2010/main" val="2313249762"/>
+      </p:ext>
+    </p:extLst>
+  </p:cSld>
+  <p:clrMapOvr>
+    <a:masterClrMapping/>
+  </p:clrMapOvr>
+</p:sld>
+</file>
+
+<file path=ppt/slides/slide6.xml><?xml version="1.0" encoding="utf-8"?>
+<p:sld xmlns:a="http://schemas.openxmlformats.org/drawingml/2006/main" xmlns:r="http://schemas.openxmlformats.org/officeDocument/2006/relationships" xmlns:p="http://schemas.openxmlformats.org/presentationml/2006/main">
+  <p:cSld>
+    <p:spTree>
+      <p:nvGrpSpPr>
+        <p:cNvPr id="1" name=""/>
+        <p:cNvGrpSpPr/>
+        <p:nvPr/>
+      </p:nvGrpSpPr>
+      <p:grpSpPr>
+        <a:xfrm>
+          <a:off x="0" y="0"/>
+          <a:ext cx="0" cy="0"/>
+          <a:chOff x="0" y="0"/>
+          <a:chExt cx="0" cy="0"/>
+        </a:xfrm>
+      </p:grpSpPr>
       <p:sp>
         <p:nvSpPr>
           <p:cNvPr id="2" name="矩形 1"/>
@@ -7506,7 +8857,7 @@
           <a:p>
             <a:pPr algn="ctr"/>
             <a:r>
-              <a:rPr lang="en-US" altLang="zh-TW" sz="2800" dirty="0" smtClean="0"/>
+              <a:rPr lang="en-US" altLang="zh-TW" sz="2800" dirty="0"/>
               <a:t>X</a:t>
             </a:r>
             <a:endParaRPr lang="zh-TW" altLang="en-US" sz="2800" dirty="0"/>
@@ -7673,7 +9024,7 @@
           <a:p>
             <a:pPr algn="ctr"/>
             <a:r>
-              <a:rPr lang="en-US" altLang="zh-TW" sz="2800" dirty="0" smtClean="0"/>
+              <a:rPr lang="en-US" altLang="zh-TW" sz="2800" dirty="0"/>
               <a:t>X</a:t>
             </a:r>
             <a:endParaRPr lang="zh-TW" altLang="en-US" sz="2800" dirty="0"/>
@@ -7780,7 +9131,7 @@
           <a:p>
             <a:pPr algn="ctr"/>
             <a:r>
-              <a:rPr lang="en-US" altLang="zh-TW" sz="2800" dirty="0" smtClean="0"/>
+              <a:rPr lang="en-US" altLang="zh-TW" sz="2800" dirty="0"/>
               <a:t>Train</a:t>
             </a:r>
             <a:endParaRPr lang="zh-TW" altLang="en-US" sz="2800" dirty="0"/>
@@ -7822,7 +9173,7 @@
           <a:p>
             <a:pPr algn="ctr"/>
             <a:r>
-              <a:rPr lang="en-US" altLang="zh-TW" sz="2800" dirty="0" smtClean="0"/>
+              <a:rPr lang="en-US" altLang="zh-TW" sz="2800" dirty="0"/>
               <a:t>X</a:t>
             </a:r>
             <a:endParaRPr lang="zh-TW" altLang="en-US" sz="2800" dirty="0"/>
@@ -7977,7 +9328,7 @@
           <a:p>
             <a:pPr algn="ctr"/>
             <a:r>
-              <a:rPr lang="en-US" altLang="zh-TW" sz="2800" dirty="0" smtClean="0"/>
+              <a:rPr lang="en-US" altLang="zh-TW" sz="2800" dirty="0"/>
               <a:t>X</a:t>
             </a:r>
             <a:endParaRPr lang="zh-TW" altLang="en-US" sz="2800" dirty="0"/>
@@ -8084,7 +9435,7 @@
           <a:p>
             <a:pPr algn="ctr"/>
             <a:r>
-              <a:rPr lang="en-US" altLang="zh-TW" sz="2800" dirty="0" smtClean="0"/>
+              <a:rPr lang="en-US" altLang="zh-TW" sz="2800" dirty="0"/>
               <a:t>Test</a:t>
             </a:r>
             <a:endParaRPr lang="zh-TW" altLang="en-US" sz="2800" dirty="0"/>
@@ -8148,7 +9499,7 @@
           <a:lstStyle/>
           <a:p>
             <a:r>
-              <a:rPr lang="en-US" altLang="zh-TW" sz="3200" dirty="0" smtClean="0">
+              <a:rPr lang="en-US" altLang="zh-TW" sz="3200" dirty="0">
                 <a:solidFill>
                   <a:schemeClr val="accent6"/>
                 </a:solidFill>
@@ -8187,10 +9538,9 @@
           <a:p>
             <a:pPr algn="ctr"/>
             <a:r>
-              <a:rPr lang="zh-TW" altLang="en-US" sz="2800" dirty="0" smtClean="0"/>
+              <a:rPr lang="zh-TW" altLang="en-US" sz="2800" dirty="0"/>
               <a:t>訓練</a:t>
             </a:r>
-            <a:endParaRPr lang="zh-TW" altLang="en-US" sz="2800" dirty="0"/>
           </a:p>
         </p:txBody>
       </p:sp>
@@ -8251,10 +9601,9 @@
           <a:p>
             <a:pPr algn="ctr"/>
             <a:r>
-              <a:rPr lang="zh-TW" altLang="en-US" sz="2800" dirty="0" smtClean="0"/>
+              <a:rPr lang="zh-TW" altLang="en-US" sz="2800" dirty="0"/>
               <a:t>預測</a:t>
             </a:r>
-            <a:endParaRPr lang="zh-TW" altLang="en-US" sz="2800" dirty="0"/>
           </a:p>
         </p:txBody>
       </p:sp>
@@ -8282,7 +9631,7 @@
           <a:p>
             <a:pPr algn="ctr"/>
             <a:r>
-              <a:rPr lang="en-US" altLang="zh-TW" sz="2800" dirty="0" smtClean="0">
+              <a:rPr lang="en-US" altLang="zh-TW" sz="2800" dirty="0">
                 <a:solidFill>
                   <a:schemeClr val="accent6"/>
                 </a:solidFill>
@@ -8321,7 +9670,7 @@
           <a:p>
             <a:pPr algn="ctr"/>
             <a:r>
-              <a:rPr lang="en-US" altLang="zh-TW" sz="2800" dirty="0" smtClean="0">
+              <a:rPr lang="en-US" altLang="zh-TW" sz="2800" dirty="0">
                 <a:solidFill>
                   <a:schemeClr val="accent4"/>
                 </a:solidFill>
@@ -8540,7 +9889,7 @@
           <a:p>
             <a:pPr algn="ctr"/>
             <a:r>
-              <a:rPr lang="en-US" altLang="zh-TW" dirty="0" smtClean="0">
+              <a:rPr lang="en-US" altLang="zh-TW" dirty="0">
                 <a:solidFill>
                   <a:schemeClr val="accent4"/>
                 </a:solidFill>

</xml_diff>